<commit_message>
odev cevaplari eklendi bumed
</commit_message>
<xml_diff>
--- a/opening_remarks.pptx
+++ b/opening_remarks.pptx
@@ -365,7 +365,7 @@
   <pc:docChgLst>
     <pc:chgData name="Erkan ŞİRİN" userId="7f10ce1d6aaf8c5d" providerId="LiveId" clId="{0E0E6E0D-F67B-4125-8FD1-98F3660D98D2}"/>
     <pc:docChg chg="custSel addSld delSld modSld sldOrd">
-      <pc:chgData name="Erkan ŞİRİN" userId="7f10ce1d6aaf8c5d" providerId="LiveId" clId="{0E0E6E0D-F67B-4125-8FD1-98F3660D98D2}" dt="2019-06-13T06:22:27.568" v="665" actId="20577"/>
+      <pc:chgData name="Erkan ŞİRİN" userId="7f10ce1d6aaf8c5d" providerId="LiveId" clId="{0E0E6E0D-F67B-4125-8FD1-98F3660D98D2}" dt="2019-06-15T11:02:51.369" v="671" actId="1076"/>
       <pc:docMkLst>
         <pc:docMk/>
       </pc:docMkLst>
@@ -398,6 +398,53 @@
             <ac:spMk id="3" creationId="{2DC8A280-C738-452F-B627-12CB68E50CC1}"/>
           </ac:spMkLst>
         </pc:spChg>
+      </pc:sldChg>
+      <pc:sldChg chg="addSp modSp">
+        <pc:chgData name="Erkan ŞİRİN" userId="7f10ce1d6aaf8c5d" providerId="LiveId" clId="{0E0E6E0D-F67B-4125-8FD1-98F3660D98D2}" dt="2019-06-15T11:02:51.369" v="671" actId="1076"/>
+        <pc:sldMkLst>
+          <pc:docMk/>
+          <pc:sldMk cId="2883417890" sldId="329"/>
+        </pc:sldMkLst>
+        <pc:spChg chg="add mod">
+          <ac:chgData name="Erkan ŞİRİN" userId="7f10ce1d6aaf8c5d" providerId="LiveId" clId="{0E0E6E0D-F67B-4125-8FD1-98F3660D98D2}" dt="2019-06-15T11:02:51.369" v="671" actId="1076"/>
+          <ac:spMkLst>
+            <pc:docMk/>
+            <pc:sldMk cId="2883417890" sldId="329"/>
+            <ac:spMk id="2" creationId="{C18A4F09-FF0E-4D70-9F20-F75EC4B9FF06}"/>
+          </ac:spMkLst>
+        </pc:spChg>
+        <pc:spChg chg="mod">
+          <ac:chgData name="Erkan ŞİRİN" userId="7f10ce1d6aaf8c5d" providerId="LiveId" clId="{0E0E6E0D-F67B-4125-8FD1-98F3660D98D2}" dt="2019-06-15T10:58:30.245" v="669" actId="1076"/>
+          <ac:spMkLst>
+            <pc:docMk/>
+            <pc:sldMk cId="2883417890" sldId="329"/>
+            <ac:spMk id="4" creationId="{FF7BC00C-9752-41A8-9C88-7451042D3C5C}"/>
+          </ac:spMkLst>
+        </pc:spChg>
+        <pc:spChg chg="mod">
+          <ac:chgData name="Erkan ŞİRİN" userId="7f10ce1d6aaf8c5d" providerId="LiveId" clId="{0E0E6E0D-F67B-4125-8FD1-98F3660D98D2}" dt="2019-06-15T10:58:30.245" v="669" actId="1076"/>
+          <ac:spMkLst>
+            <pc:docMk/>
+            <pc:sldMk cId="2883417890" sldId="329"/>
+            <ac:spMk id="5" creationId="{34DF71B8-B6CB-403D-B382-6A34CAAB5B4E}"/>
+          </ac:spMkLst>
+        </pc:spChg>
+        <pc:spChg chg="mod">
+          <ac:chgData name="Erkan ŞİRİN" userId="7f10ce1d6aaf8c5d" providerId="LiveId" clId="{0E0E6E0D-F67B-4125-8FD1-98F3660D98D2}" dt="2019-06-15T10:58:22.729" v="667" actId="1076"/>
+          <ac:spMkLst>
+            <pc:docMk/>
+            <pc:sldMk cId="2883417890" sldId="329"/>
+            <ac:spMk id="13" creationId="{00000000-0000-0000-0000-000000000000}"/>
+          </ac:spMkLst>
+        </pc:spChg>
+        <pc:picChg chg="mod">
+          <ac:chgData name="Erkan ŞİRİN" userId="7f10ce1d6aaf8c5d" providerId="LiveId" clId="{0E0E6E0D-F67B-4125-8FD1-98F3660D98D2}" dt="2019-06-15T10:58:25.940" v="668" actId="1076"/>
+          <ac:picMkLst>
+            <pc:docMk/>
+            <pc:sldMk cId="2883417890" sldId="329"/>
+            <ac:picMk id="3" creationId="{00000000-0000-0000-0000-000000000000}"/>
+          </ac:picMkLst>
+        </pc:picChg>
       </pc:sldChg>
       <pc:sldChg chg="modSp modAnim">
         <pc:chgData name="Erkan ŞİRİN" userId="7f10ce1d6aaf8c5d" providerId="LiveId" clId="{0E0E6E0D-F67B-4125-8FD1-98F3660D98D2}" dt="2019-06-13T06:04:18.307" v="601" actId="255"/>
@@ -572,45 +619,6 @@
           </ac:picMkLst>
         </pc:picChg>
       </pc:sldChg>
-      <pc:sldChg chg="addSp delSp modSp add del ord">
-        <pc:chgData name="Erkan ŞİRİN" userId="7f10ce1d6aaf8c5d" providerId="LiveId" clId="{0E0E6E0D-F67B-4125-8FD1-98F3660D98D2}" dt="2019-06-13T05:55:10.650" v="227" actId="2696"/>
-        <pc:sldMkLst>
-          <pc:docMk/>
-          <pc:sldMk cId="1206312110" sldId="340"/>
-        </pc:sldMkLst>
-        <pc:spChg chg="add mod">
-          <ac:chgData name="Erkan ŞİRİN" userId="7f10ce1d6aaf8c5d" providerId="LiveId" clId="{0E0E6E0D-F67B-4125-8FD1-98F3660D98D2}" dt="2019-06-12T19:39:21.541" v="82" actId="1076"/>
-          <ac:spMkLst>
-            <pc:docMk/>
-            <pc:sldMk cId="1206312110" sldId="340"/>
-            <ac:spMk id="2" creationId="{804D80D6-B333-483D-9465-2443E76896B6}"/>
-          </ac:spMkLst>
-        </pc:spChg>
-        <pc:spChg chg="mod">
-          <ac:chgData name="Erkan ŞİRİN" userId="7f10ce1d6aaf8c5d" providerId="LiveId" clId="{0E0E6E0D-F67B-4125-8FD1-98F3660D98D2}" dt="2019-06-12T19:39:03.076" v="66" actId="1076"/>
-          <ac:spMkLst>
-            <pc:docMk/>
-            <pc:sldMk cId="1206312110" sldId="340"/>
-            <ac:spMk id="5" creationId="{2E79593C-AA84-4F0F-BB9B-1B5A70AC7FE0}"/>
-          </ac:spMkLst>
-        </pc:spChg>
-        <pc:spChg chg="del mod">
-          <ac:chgData name="Erkan ŞİRİN" userId="7f10ce1d6aaf8c5d" providerId="LiveId" clId="{0E0E6E0D-F67B-4125-8FD1-98F3660D98D2}" dt="2019-06-12T19:39:06.660" v="68" actId="478"/>
-          <ac:spMkLst>
-            <pc:docMk/>
-            <pc:sldMk cId="1206312110" sldId="340"/>
-            <ac:spMk id="7" creationId="{1D61EBCE-31AA-48F0-8EE0-52989DAEFFDE}"/>
-          </ac:spMkLst>
-        </pc:spChg>
-        <pc:picChg chg="del">
-          <ac:chgData name="Erkan ŞİRİN" userId="7f10ce1d6aaf8c5d" providerId="LiveId" clId="{0E0E6E0D-F67B-4125-8FD1-98F3660D98D2}" dt="2019-06-12T19:38:49.790" v="63" actId="478"/>
-          <ac:picMkLst>
-            <pc:docMk/>
-            <pc:sldMk cId="1206312110" sldId="340"/>
-            <ac:picMk id="3" creationId="{3DC4C4A6-EADF-4792-B7B6-0FFFF50F4D75}"/>
-          </ac:picMkLst>
-        </pc:picChg>
-      </pc:sldChg>
       <pc:sldChg chg="addSp delSp modSp add">
         <pc:chgData name="Erkan ŞİRİN" userId="7f10ce1d6aaf8c5d" providerId="LiveId" clId="{0E0E6E0D-F67B-4125-8FD1-98F3660D98D2}" dt="2019-06-12T19:46:33.348" v="97"/>
         <pc:sldMkLst>
@@ -726,13 +734,6 @@
           </ac:picMkLst>
         </pc:picChg>
       </pc:sldChg>
-      <pc:sldChg chg="add del">
-        <pc:chgData name="Erkan ŞİRİN" userId="7f10ce1d6aaf8c5d" providerId="LiveId" clId="{0E0E6E0D-F67B-4125-8FD1-98F3660D98D2}" dt="2019-06-13T06:05:31.978" v="604" actId="2696"/>
-        <pc:sldMkLst>
-          <pc:docMk/>
-          <pc:sldMk cId="323060194" sldId="346"/>
-        </pc:sldMkLst>
-      </pc:sldChg>
     </pc:docChg>
   </pc:docChgLst>
 </pc:chgInfo>
@@ -885,7 +886,7 @@
           <a:p>
             <a:fld id="{BAB971F1-0A24-473E-8A66-D77E329B588E}" type="datetimeFigureOut">
               <a:rPr lang="tr-TR" smtClean="0"/>
-              <a:t>13.06.2019</a:t>
+              <a:t>15.06.2019</a:t>
             </a:fld>
             <a:endParaRPr lang="tr-TR"/>
           </a:p>
@@ -1083,7 +1084,7 @@
           <a:p>
             <a:fld id="{BAB971F1-0A24-473E-8A66-D77E329B588E}" type="datetimeFigureOut">
               <a:rPr lang="tr-TR" smtClean="0"/>
-              <a:t>13.06.2019</a:t>
+              <a:t>15.06.2019</a:t>
             </a:fld>
             <a:endParaRPr lang="tr-TR"/>
           </a:p>
@@ -1291,7 +1292,7 @@
           <a:p>
             <a:fld id="{BAB971F1-0A24-473E-8A66-D77E329B588E}" type="datetimeFigureOut">
               <a:rPr lang="tr-TR" smtClean="0"/>
-              <a:t>13.06.2019</a:t>
+              <a:t>15.06.2019</a:t>
             </a:fld>
             <a:endParaRPr lang="tr-TR"/>
           </a:p>
@@ -1489,7 +1490,7 @@
           <a:p>
             <a:fld id="{BAB971F1-0A24-473E-8A66-D77E329B588E}" type="datetimeFigureOut">
               <a:rPr lang="tr-TR" smtClean="0"/>
-              <a:t>13.06.2019</a:t>
+              <a:t>15.06.2019</a:t>
             </a:fld>
             <a:endParaRPr lang="tr-TR"/>
           </a:p>
@@ -1764,7 +1765,7 @@
           <a:p>
             <a:fld id="{BAB971F1-0A24-473E-8A66-D77E329B588E}" type="datetimeFigureOut">
               <a:rPr lang="tr-TR" smtClean="0"/>
-              <a:t>13.06.2019</a:t>
+              <a:t>15.06.2019</a:t>
             </a:fld>
             <a:endParaRPr lang="tr-TR"/>
           </a:p>
@@ -2029,7 +2030,7 @@
           <a:p>
             <a:fld id="{BAB971F1-0A24-473E-8A66-D77E329B588E}" type="datetimeFigureOut">
               <a:rPr lang="tr-TR" smtClean="0"/>
-              <a:t>13.06.2019</a:t>
+              <a:t>15.06.2019</a:t>
             </a:fld>
             <a:endParaRPr lang="tr-TR"/>
           </a:p>
@@ -2441,7 +2442,7 @@
           <a:p>
             <a:fld id="{BAB971F1-0A24-473E-8A66-D77E329B588E}" type="datetimeFigureOut">
               <a:rPr lang="tr-TR" smtClean="0"/>
-              <a:t>13.06.2019</a:t>
+              <a:t>15.06.2019</a:t>
             </a:fld>
             <a:endParaRPr lang="tr-TR"/>
           </a:p>
@@ -2582,7 +2583,7 @@
           <a:p>
             <a:fld id="{BAB971F1-0A24-473E-8A66-D77E329B588E}" type="datetimeFigureOut">
               <a:rPr lang="tr-TR" smtClean="0"/>
-              <a:t>13.06.2019</a:t>
+              <a:t>15.06.2019</a:t>
             </a:fld>
             <a:endParaRPr lang="tr-TR"/>
           </a:p>
@@ -2695,7 +2696,7 @@
           <a:p>
             <a:fld id="{BAB971F1-0A24-473E-8A66-D77E329B588E}" type="datetimeFigureOut">
               <a:rPr lang="tr-TR" smtClean="0"/>
-              <a:t>13.06.2019</a:t>
+              <a:t>15.06.2019</a:t>
             </a:fld>
             <a:endParaRPr lang="tr-TR"/>
           </a:p>
@@ -3006,7 +3007,7 @@
           <a:p>
             <a:fld id="{BAB971F1-0A24-473E-8A66-D77E329B588E}" type="datetimeFigureOut">
               <a:rPr lang="tr-TR" smtClean="0"/>
-              <a:t>13.06.2019</a:t>
+              <a:t>15.06.2019</a:t>
             </a:fld>
             <a:endParaRPr lang="tr-TR"/>
           </a:p>
@@ -3294,7 +3295,7 @@
           <a:p>
             <a:fld id="{BAB971F1-0A24-473E-8A66-D77E329B588E}" type="datetimeFigureOut">
               <a:rPr lang="tr-TR" smtClean="0"/>
-              <a:t>13.06.2019</a:t>
+              <a:t>15.06.2019</a:t>
             </a:fld>
             <a:endParaRPr lang="tr-TR"/>
           </a:p>
@@ -3535,7 +3536,7 @@
           <a:p>
             <a:fld id="{BAB971F1-0A24-473E-8A66-D77E329B588E}" type="datetimeFigureOut">
               <a:rPr lang="tr-TR" smtClean="0"/>
-              <a:t>13.06.2019</a:t>
+              <a:t>15.06.2019</a:t>
             </a:fld>
             <a:endParaRPr lang="tr-TR"/>
           </a:p>
@@ -4938,8 +4939,8 @@
         </p:nvSpPr>
         <p:spPr>
           <a:xfrm>
-            <a:off x="6001407" y="1059184"/>
-            <a:ext cx="5276193" cy="3970318"/>
+            <a:off x="6096000" y="891544"/>
+            <a:ext cx="5276193" cy="3070841"/>
           </a:xfrm>
           <a:prstGeom prst="rect">
             <a:avLst/>
@@ -4966,20 +4967,6 @@
               </a:rPr>
               <a:t>Erkan ŞİRİN</a:t>
             </a:r>
-          </a:p>
-          <a:p>
-            <a:pPr>
-              <a:lnSpc>
-                <a:spcPct val="150000"/>
-              </a:lnSpc>
-            </a:pPr>
-            <a:endParaRPr lang="tr-TR" sz="3600" dirty="0">
-              <a:solidFill>
-                <a:srgbClr val="404041"/>
-              </a:solidFill>
-              <a:latin typeface="Verdana" panose="020B0604030504040204" pitchFamily="34" charset="0"/>
-              <a:ea typeface="Verdana" panose="020B0604030504040204" pitchFamily="34" charset="0"/>
-            </a:endParaRPr>
           </a:p>
           <a:p>
             <a:pPr>
@@ -5074,7 +5061,7 @@
         </p:blipFill>
         <p:spPr>
           <a:xfrm>
-            <a:off x="2440468" y="1842367"/>
+            <a:off x="1733292" y="1334050"/>
             <a:ext cx="2700528" cy="2628335"/>
           </a:xfrm>
           <a:prstGeom prst="rect">
@@ -5096,7 +5083,7 @@
         </p:nvSpPr>
         <p:spPr>
           <a:xfrm>
-            <a:off x="1733292" y="5029502"/>
+            <a:off x="1164601" y="4328462"/>
             <a:ext cx="3837910" cy="830997"/>
           </a:xfrm>
           <a:prstGeom prst="rect">
@@ -5148,7 +5135,7 @@
         </p:nvSpPr>
         <p:spPr>
           <a:xfrm>
-            <a:off x="2170422" y="5983481"/>
+            <a:off x="1601731" y="5282441"/>
             <a:ext cx="2762295" cy="461665"/>
           </a:xfrm>
           <a:prstGeom prst="rect">
@@ -5170,6 +5157,92 @@
               </a:rPr>
               <a:t>+90 506 543 2731</a:t>
             </a:r>
+          </a:p>
+        </p:txBody>
+      </p:sp>
+      <p:sp>
+        <p:nvSpPr>
+          <p:cNvPr id="2" name="Dikdörtgen 1">
+            <a:extLst>
+              <a:ext uri="{FF2B5EF4-FFF2-40B4-BE49-F238E27FC236}">
+                <a16:creationId xmlns:a16="http://schemas.microsoft.com/office/drawing/2014/main" id="{C18A4F09-FF0E-4D70-9F20-F75EC4B9FF06}"/>
+              </a:ext>
+            </a:extLst>
+          </p:cNvPr>
+          <p:cNvSpPr/>
+          <p:nvPr/>
+        </p:nvSpPr>
+        <p:spPr>
+          <a:xfrm>
+            <a:off x="5686096" y="4308010"/>
+            <a:ext cx="6096000" cy="772712"/>
+          </a:xfrm>
+          <a:prstGeom prst="rect">
+            <a:avLst/>
+          </a:prstGeom>
+        </p:spPr>
+        <p:txBody>
+          <a:bodyPr>
+            <a:spAutoFit/>
+          </a:bodyPr>
+          <a:lstStyle/>
+          <a:p>
+            <a:pPr marL="457200" algn="just">
+              <a:lnSpc>
+                <a:spcPct val="107000"/>
+              </a:lnSpc>
+              <a:spcAft>
+                <a:spcPts val="800"/>
+              </a:spcAft>
+            </a:pPr>
+            <a:r>
+              <a:rPr lang="tr-TR" b="1" dirty="0" err="1">
+                <a:latin typeface="Arial" panose="020B0604020202020204" pitchFamily="34" charset="0"/>
+                <a:ea typeface="Calibri" panose="020F0502020204030204" pitchFamily="34" charset="0"/>
+                <a:cs typeface="Times New Roman" panose="02020603050405020304" pitchFamily="18" charset="0"/>
+              </a:rPr>
+              <a:t>LinkedIn</a:t>
+            </a:r>
+            <a:r>
+              <a:rPr lang="tr-TR" dirty="0">
+                <a:latin typeface="Arial" panose="020B0604020202020204" pitchFamily="34" charset="0"/>
+                <a:ea typeface="Calibri" panose="020F0502020204030204" pitchFamily="34" charset="0"/>
+                <a:cs typeface="Times New Roman" panose="02020603050405020304" pitchFamily="18" charset="0"/>
+              </a:rPr>
+              <a:t>:</a:t>
+            </a:r>
+            <a:endParaRPr lang="tr-TR" dirty="0">
+              <a:latin typeface="Calibri" panose="020F0502020204030204" pitchFamily="34" charset="0"/>
+              <a:ea typeface="Calibri" panose="020F0502020204030204" pitchFamily="34" charset="0"/>
+              <a:cs typeface="Times New Roman" panose="02020603050405020304" pitchFamily="18" charset="0"/>
+            </a:endParaRPr>
+          </a:p>
+          <a:p>
+            <a:pPr marL="457200" algn="just">
+              <a:lnSpc>
+                <a:spcPct val="107000"/>
+              </a:lnSpc>
+              <a:spcAft>
+                <a:spcPts val="800"/>
+              </a:spcAft>
+            </a:pPr>
+            <a:r>
+              <a:rPr lang="tr-TR" u="sng" dirty="0">
+                <a:solidFill>
+                  <a:srgbClr val="0563C1"/>
+                </a:solidFill>
+                <a:latin typeface="Arial" panose="020B0604020202020204" pitchFamily="34" charset="0"/>
+                <a:ea typeface="Calibri" panose="020F0502020204030204" pitchFamily="34" charset="0"/>
+                <a:cs typeface="Times New Roman" panose="02020603050405020304" pitchFamily="18" charset="0"/>
+                <a:hlinkClick r:id="rId5"/>
+              </a:rPr>
+              <a:t>https://www.linkedin.com/in/erkansirin78</a:t>
+            </a:r>
+            <a:endParaRPr lang="tr-TR" dirty="0">
+              <a:latin typeface="Calibri" panose="020F0502020204030204" pitchFamily="34" charset="0"/>
+              <a:ea typeface="Calibri" panose="020F0502020204030204" pitchFamily="34" charset="0"/>
+              <a:cs typeface="Times New Roman" panose="02020603050405020304" pitchFamily="18" charset="0"/>
+            </a:endParaRPr>
           </a:p>
         </p:txBody>
       </p:sp>

</xml_diff>

<commit_message>
virtual env kurulum notları güncellendi
</commit_message>
<xml_diff>
--- a/opening_remarks.pptx
+++ b/opening_remarks.pptx
@@ -17,6 +17,14 @@
     <p:sldId id="338" r:id="rId11"/>
     <p:sldId id="341" r:id="rId12"/>
     <p:sldId id="339" r:id="rId13"/>
+    <p:sldId id="346" r:id="rId14"/>
+    <p:sldId id="386" r:id="rId15"/>
+    <p:sldId id="388" r:id="rId16"/>
+    <p:sldId id="389" r:id="rId17"/>
+    <p:sldId id="392" r:id="rId18"/>
+    <p:sldId id="390" r:id="rId19"/>
+    <p:sldId id="391" r:id="rId20"/>
+    <p:sldId id="385" r:id="rId21"/>
   </p:sldIdLst>
   <p:sldSz cx="12192000" cy="6858000"/>
   <p:notesSz cx="6858000" cy="9144000"/>
@@ -365,18 +373,18 @@
   <pc:docChgLst>
     <pc:chgData name="Erkan ŞİRİN" userId="7f10ce1d6aaf8c5d" providerId="LiveId" clId="{0E0E6E0D-F67B-4125-8FD1-98F3660D98D2}"/>
     <pc:docChg chg="custSel addSld delSld modSld sldOrd">
-      <pc:chgData name="Erkan ŞİRİN" userId="7f10ce1d6aaf8c5d" providerId="LiveId" clId="{0E0E6E0D-F67B-4125-8FD1-98F3660D98D2}" dt="2019-06-17T09:47:22.326" v="774" actId="20577"/>
+      <pc:chgData name="Erkan ŞİRİN" userId="7f10ce1d6aaf8c5d" providerId="LiveId" clId="{0E0E6E0D-F67B-4125-8FD1-98F3660D98D2}" dt="2019-07-28T12:22:57.530" v="808" actId="20577"/>
       <pc:docMkLst>
         <pc:docMk/>
       </pc:docMkLst>
       <pc:sldChg chg="modSp">
-        <pc:chgData name="Erkan ŞİRİN" userId="7f10ce1d6aaf8c5d" providerId="LiveId" clId="{0E0E6E0D-F67B-4125-8FD1-98F3660D98D2}" dt="2019-06-13T05:37:18.580" v="204" actId="20577"/>
+        <pc:chgData name="Erkan ŞİRİN" userId="7f10ce1d6aaf8c5d" providerId="LiveId" clId="{0E0E6E0D-F67B-4125-8FD1-98F3660D98D2}" dt="2019-07-04T14:25:16.572" v="775" actId="6549"/>
         <pc:sldMkLst>
           <pc:docMk/>
           <pc:sldMk cId="2918214722" sldId="256"/>
         </pc:sldMkLst>
         <pc:spChg chg="mod">
-          <ac:chgData name="Erkan ŞİRİN" userId="7f10ce1d6aaf8c5d" providerId="LiveId" clId="{0E0E6E0D-F67B-4125-8FD1-98F3660D98D2}" dt="2019-06-13T05:37:18.580" v="204" actId="20577"/>
+          <ac:chgData name="Erkan ŞİRİN" userId="7f10ce1d6aaf8c5d" providerId="LiveId" clId="{0E0E6E0D-F67B-4125-8FD1-98F3660D98D2}" dt="2019-07-04T14:25:16.572" v="775" actId="6549"/>
           <ac:spMkLst>
             <pc:docMk/>
             <pc:sldMk cId="2918214722" sldId="256"/>
@@ -470,7 +478,7 @@
         </pc:spChg>
       </pc:sldChg>
       <pc:sldChg chg="addSp delSp modSp add delAnim">
-        <pc:chgData name="Erkan ŞİRİN" userId="7f10ce1d6aaf8c5d" providerId="LiveId" clId="{0E0E6E0D-F67B-4125-8FD1-98F3660D98D2}" dt="2019-06-12T19:41:37.924" v="91"/>
+        <pc:chgData name="Erkan ŞİRİN" userId="7f10ce1d6aaf8c5d" providerId="LiveId" clId="{0E0E6E0D-F67B-4125-8FD1-98F3660D98D2}" dt="2019-07-28T12:21:17.664" v="779" actId="20577"/>
         <pc:sldMkLst>
           <pc:docMk/>
           <pc:sldMk cId="1944784783" sldId="338"/>
@@ -492,7 +500,7 @@
           </ac:spMkLst>
         </pc:spChg>
         <pc:spChg chg="mod">
-          <ac:chgData name="Erkan ŞİRİN" userId="7f10ce1d6aaf8c5d" providerId="LiveId" clId="{0E0E6E0D-F67B-4125-8FD1-98F3660D98D2}" dt="2019-06-11T03:32:20.207" v="28" actId="1076"/>
+          <ac:chgData name="Erkan ŞİRİN" userId="7f10ce1d6aaf8c5d" providerId="LiveId" clId="{0E0E6E0D-F67B-4125-8FD1-98F3660D98D2}" dt="2019-07-28T12:21:17.664" v="779" actId="20577"/>
           <ac:spMkLst>
             <pc:docMk/>
             <pc:sldMk cId="1944784783" sldId="338"/>
@@ -525,7 +533,7 @@
         </pc:picChg>
       </pc:sldChg>
       <pc:sldChg chg="addSp delSp modSp add">
-        <pc:chgData name="Erkan ŞİRİN" userId="7f10ce1d6aaf8c5d" providerId="LiveId" clId="{0E0E6E0D-F67B-4125-8FD1-98F3660D98D2}" dt="2019-06-17T09:47:22.326" v="774" actId="20577"/>
+        <pc:chgData name="Erkan ŞİRİN" userId="7f10ce1d6aaf8c5d" providerId="LiveId" clId="{0E0E6E0D-F67B-4125-8FD1-98F3660D98D2}" dt="2019-07-28T12:21:29.547" v="781"/>
         <pc:sldMkLst>
           <pc:docMk/>
           <pc:sldMk cId="915150309" sldId="339"/>
@@ -610,6 +618,14 @@
             <ac:spMk id="14" creationId="{5F66CAAC-600E-4CC7-B994-71507352AEC2}"/>
           </ac:spMkLst>
         </pc:spChg>
+        <pc:spChg chg="mod">
+          <ac:chgData name="Erkan ŞİRİN" userId="7f10ce1d6aaf8c5d" providerId="LiveId" clId="{0E0E6E0D-F67B-4125-8FD1-98F3660D98D2}" dt="2019-07-28T12:21:29.547" v="781"/>
+          <ac:spMkLst>
+            <pc:docMk/>
+            <pc:sldMk cId="915150309" sldId="339"/>
+            <ac:spMk id="16" creationId="{00000000-0000-0000-0000-000000000000}"/>
+          </ac:spMkLst>
+        </pc:spChg>
         <pc:picChg chg="add mod">
           <ac:chgData name="Erkan ŞİRİN" userId="7f10ce1d6aaf8c5d" providerId="LiveId" clId="{0E0E6E0D-F67B-4125-8FD1-98F3660D98D2}" dt="2019-06-11T03:38:10.060" v="51"/>
           <ac:picMkLst>
@@ -636,11 +652,19 @@
         </pc:picChg>
       </pc:sldChg>
       <pc:sldChg chg="addSp delSp modSp add">
-        <pc:chgData name="Erkan ŞİRİN" userId="7f10ce1d6aaf8c5d" providerId="LiveId" clId="{0E0E6E0D-F67B-4125-8FD1-98F3660D98D2}" dt="2019-06-12T19:46:33.348" v="97"/>
+        <pc:chgData name="Erkan ŞİRİN" userId="7f10ce1d6aaf8c5d" providerId="LiveId" clId="{0E0E6E0D-F67B-4125-8FD1-98F3660D98D2}" dt="2019-07-28T12:21:25.638" v="780"/>
         <pc:sldMkLst>
           <pc:docMk/>
           <pc:sldMk cId="2201042094" sldId="341"/>
         </pc:sldMkLst>
+        <pc:spChg chg="mod">
+          <ac:chgData name="Erkan ŞİRİN" userId="7f10ce1d6aaf8c5d" providerId="LiveId" clId="{0E0E6E0D-F67B-4125-8FD1-98F3660D98D2}" dt="2019-07-28T12:21:25.638" v="780"/>
+          <ac:spMkLst>
+            <pc:docMk/>
+            <pc:sldMk cId="2201042094" sldId="341"/>
+            <ac:spMk id="16" creationId="{00000000-0000-0000-0000-000000000000}"/>
+          </ac:spMkLst>
+        </pc:spChg>
         <pc:picChg chg="add mod">
           <ac:chgData name="Erkan ŞİRİN" userId="7f10ce1d6aaf8c5d" providerId="LiveId" clId="{0E0E6E0D-F67B-4125-8FD1-98F3660D98D2}" dt="2019-06-12T19:46:33.348" v="97"/>
           <ac:picMkLst>
@@ -750,6 +774,126 @@
           </ac:picMkLst>
         </pc:picChg>
       </pc:sldChg>
+      <pc:sldChg chg="modSp add">
+        <pc:chgData name="Erkan ŞİRİN" userId="7f10ce1d6aaf8c5d" providerId="LiveId" clId="{0E0E6E0D-F67B-4125-8FD1-98F3660D98D2}" dt="2019-07-28T12:21:43.817" v="783" actId="20577"/>
+        <pc:sldMkLst>
+          <pc:docMk/>
+          <pc:sldMk cId="3622917333" sldId="346"/>
+        </pc:sldMkLst>
+        <pc:spChg chg="mod">
+          <ac:chgData name="Erkan ŞİRİN" userId="7f10ce1d6aaf8c5d" providerId="LiveId" clId="{0E0E6E0D-F67B-4125-8FD1-98F3660D98D2}" dt="2019-07-28T12:21:43.817" v="783" actId="20577"/>
+          <ac:spMkLst>
+            <pc:docMk/>
+            <pc:sldMk cId="3622917333" sldId="346"/>
+            <ac:spMk id="3" creationId="{D42DE1B9-BAF2-438A-99D4-A19B593936A9}"/>
+          </ac:spMkLst>
+        </pc:spChg>
+      </pc:sldChg>
+      <pc:sldChg chg="modSp add">
+        <pc:chgData name="Erkan ŞİRİN" userId="7f10ce1d6aaf8c5d" providerId="LiveId" clId="{0E0E6E0D-F67B-4125-8FD1-98F3660D98D2}" dt="2019-07-28T12:22:57.530" v="808" actId="20577"/>
+        <pc:sldMkLst>
+          <pc:docMk/>
+          <pc:sldMk cId="3211515688" sldId="385"/>
+        </pc:sldMkLst>
+        <pc:spChg chg="mod">
+          <ac:chgData name="Erkan ŞİRİN" userId="7f10ce1d6aaf8c5d" providerId="LiveId" clId="{0E0E6E0D-F67B-4125-8FD1-98F3660D98D2}" dt="2019-07-28T12:22:57.530" v="808" actId="20577"/>
+          <ac:spMkLst>
+            <pc:docMk/>
+            <pc:sldMk cId="3211515688" sldId="385"/>
+            <ac:spMk id="3" creationId="{D42DE1B9-BAF2-438A-99D4-A19B593936A9}"/>
+          </ac:spMkLst>
+        </pc:spChg>
+      </pc:sldChg>
+      <pc:sldChg chg="modSp add">
+        <pc:chgData name="Erkan ŞİRİN" userId="7f10ce1d6aaf8c5d" providerId="LiveId" clId="{0E0E6E0D-F67B-4125-8FD1-98F3660D98D2}" dt="2019-07-28T12:21:49.848" v="785" actId="20577"/>
+        <pc:sldMkLst>
+          <pc:docMk/>
+          <pc:sldMk cId="1361825446" sldId="386"/>
+        </pc:sldMkLst>
+        <pc:spChg chg="mod">
+          <ac:chgData name="Erkan ŞİRİN" userId="7f10ce1d6aaf8c5d" providerId="LiveId" clId="{0E0E6E0D-F67B-4125-8FD1-98F3660D98D2}" dt="2019-07-28T12:21:49.848" v="785" actId="20577"/>
+          <ac:spMkLst>
+            <pc:docMk/>
+            <pc:sldMk cId="1361825446" sldId="386"/>
+            <ac:spMk id="3" creationId="{D42DE1B9-BAF2-438A-99D4-A19B593936A9}"/>
+          </ac:spMkLst>
+        </pc:spChg>
+      </pc:sldChg>
+      <pc:sldChg chg="modSp add">
+        <pc:chgData name="Erkan ŞİRİN" userId="7f10ce1d6aaf8c5d" providerId="LiveId" clId="{0E0E6E0D-F67B-4125-8FD1-98F3660D98D2}" dt="2019-07-28T12:21:56.104" v="787" actId="20577"/>
+        <pc:sldMkLst>
+          <pc:docMk/>
+          <pc:sldMk cId="1541464282" sldId="388"/>
+        </pc:sldMkLst>
+        <pc:spChg chg="mod">
+          <ac:chgData name="Erkan ŞİRİN" userId="7f10ce1d6aaf8c5d" providerId="LiveId" clId="{0E0E6E0D-F67B-4125-8FD1-98F3660D98D2}" dt="2019-07-28T12:21:56.104" v="787" actId="20577"/>
+          <ac:spMkLst>
+            <pc:docMk/>
+            <pc:sldMk cId="1541464282" sldId="388"/>
+            <ac:spMk id="3" creationId="{D42DE1B9-BAF2-438A-99D4-A19B593936A9}"/>
+          </ac:spMkLst>
+        </pc:spChg>
+      </pc:sldChg>
+      <pc:sldChg chg="modSp add">
+        <pc:chgData name="Erkan ŞİRİN" userId="7f10ce1d6aaf8c5d" providerId="LiveId" clId="{0E0E6E0D-F67B-4125-8FD1-98F3660D98D2}" dt="2019-07-28T12:22:33.877" v="792" actId="20577"/>
+        <pc:sldMkLst>
+          <pc:docMk/>
+          <pc:sldMk cId="2865463576" sldId="389"/>
+        </pc:sldMkLst>
+        <pc:spChg chg="mod">
+          <ac:chgData name="Erkan ŞİRİN" userId="7f10ce1d6aaf8c5d" providerId="LiveId" clId="{0E0E6E0D-F67B-4125-8FD1-98F3660D98D2}" dt="2019-07-28T12:22:33.877" v="792" actId="20577"/>
+          <ac:spMkLst>
+            <pc:docMk/>
+            <pc:sldMk cId="2865463576" sldId="389"/>
+            <ac:spMk id="3" creationId="{D42DE1B9-BAF2-438A-99D4-A19B593936A9}"/>
+          </ac:spMkLst>
+        </pc:spChg>
+      </pc:sldChg>
+      <pc:sldChg chg="modSp add">
+        <pc:chgData name="Erkan ŞİRİN" userId="7f10ce1d6aaf8c5d" providerId="LiveId" clId="{0E0E6E0D-F67B-4125-8FD1-98F3660D98D2}" dt="2019-07-28T12:22:48.320" v="802" actId="20577"/>
+        <pc:sldMkLst>
+          <pc:docMk/>
+          <pc:sldMk cId="2632417626" sldId="390"/>
+        </pc:sldMkLst>
+        <pc:spChg chg="mod">
+          <ac:chgData name="Erkan ŞİRİN" userId="7f10ce1d6aaf8c5d" providerId="LiveId" clId="{0E0E6E0D-F67B-4125-8FD1-98F3660D98D2}" dt="2019-07-28T12:22:48.320" v="802" actId="20577"/>
+          <ac:spMkLst>
+            <pc:docMk/>
+            <pc:sldMk cId="2632417626" sldId="390"/>
+            <ac:spMk id="3" creationId="{D42DE1B9-BAF2-438A-99D4-A19B593936A9}"/>
+          </ac:spMkLst>
+        </pc:spChg>
+      </pc:sldChg>
+      <pc:sldChg chg="modSp add">
+        <pc:chgData name="Erkan ŞİRİN" userId="7f10ce1d6aaf8c5d" providerId="LiveId" clId="{0E0E6E0D-F67B-4125-8FD1-98F3660D98D2}" dt="2019-07-28T12:22:52.832" v="805" actId="20577"/>
+        <pc:sldMkLst>
+          <pc:docMk/>
+          <pc:sldMk cId="2030863806" sldId="391"/>
+        </pc:sldMkLst>
+        <pc:spChg chg="mod">
+          <ac:chgData name="Erkan ŞİRİN" userId="7f10ce1d6aaf8c5d" providerId="LiveId" clId="{0E0E6E0D-F67B-4125-8FD1-98F3660D98D2}" dt="2019-07-28T12:22:52.832" v="805" actId="20577"/>
+          <ac:spMkLst>
+            <pc:docMk/>
+            <pc:sldMk cId="2030863806" sldId="391"/>
+            <ac:spMk id="3" creationId="{D42DE1B9-BAF2-438A-99D4-A19B593936A9}"/>
+          </ac:spMkLst>
+        </pc:spChg>
+      </pc:sldChg>
+      <pc:sldChg chg="modSp add">
+        <pc:chgData name="Erkan ŞİRİN" userId="7f10ce1d6aaf8c5d" providerId="LiveId" clId="{0E0E6E0D-F67B-4125-8FD1-98F3660D98D2}" dt="2019-07-28T12:22:42.455" v="799" actId="20577"/>
+        <pc:sldMkLst>
+          <pc:docMk/>
+          <pc:sldMk cId="2593947091" sldId="392"/>
+        </pc:sldMkLst>
+        <pc:spChg chg="mod">
+          <ac:chgData name="Erkan ŞİRİN" userId="7f10ce1d6aaf8c5d" providerId="LiveId" clId="{0E0E6E0D-F67B-4125-8FD1-98F3660D98D2}" dt="2019-07-28T12:22:42.455" v="799" actId="20577"/>
+          <ac:spMkLst>
+            <pc:docMk/>
+            <pc:sldMk cId="2593947091" sldId="392"/>
+            <ac:spMk id="3" creationId="{D42DE1B9-BAF2-438A-99D4-A19B593936A9}"/>
+          </ac:spMkLst>
+        </pc:spChg>
+      </pc:sldChg>
     </pc:docChg>
   </pc:docChgLst>
 </pc:chgInfo>
@@ -902,7 +1046,7 @@
           <a:p>
             <a:fld id="{BAB971F1-0A24-473E-8A66-D77E329B588E}" type="datetimeFigureOut">
               <a:rPr lang="tr-TR" smtClean="0"/>
-              <a:t>17.06.2019</a:t>
+              <a:t>28.07.2019</a:t>
             </a:fld>
             <a:endParaRPr lang="tr-TR"/>
           </a:p>
@@ -1100,7 +1244,7 @@
           <a:p>
             <a:fld id="{BAB971F1-0A24-473E-8A66-D77E329B588E}" type="datetimeFigureOut">
               <a:rPr lang="tr-TR" smtClean="0"/>
-              <a:t>17.06.2019</a:t>
+              <a:t>28.07.2019</a:t>
             </a:fld>
             <a:endParaRPr lang="tr-TR"/>
           </a:p>
@@ -1308,7 +1452,7 @@
           <a:p>
             <a:fld id="{BAB971F1-0A24-473E-8A66-D77E329B588E}" type="datetimeFigureOut">
               <a:rPr lang="tr-TR" smtClean="0"/>
-              <a:t>17.06.2019</a:t>
+              <a:t>28.07.2019</a:t>
             </a:fld>
             <a:endParaRPr lang="tr-TR"/>
           </a:p>
@@ -1506,7 +1650,7 @@
           <a:p>
             <a:fld id="{BAB971F1-0A24-473E-8A66-D77E329B588E}" type="datetimeFigureOut">
               <a:rPr lang="tr-TR" smtClean="0"/>
-              <a:t>17.06.2019</a:t>
+              <a:t>28.07.2019</a:t>
             </a:fld>
             <a:endParaRPr lang="tr-TR"/>
           </a:p>
@@ -1781,7 +1925,7 @@
           <a:p>
             <a:fld id="{BAB971F1-0A24-473E-8A66-D77E329B588E}" type="datetimeFigureOut">
               <a:rPr lang="tr-TR" smtClean="0"/>
-              <a:t>17.06.2019</a:t>
+              <a:t>28.07.2019</a:t>
             </a:fld>
             <a:endParaRPr lang="tr-TR"/>
           </a:p>
@@ -2046,7 +2190,7 @@
           <a:p>
             <a:fld id="{BAB971F1-0A24-473E-8A66-D77E329B588E}" type="datetimeFigureOut">
               <a:rPr lang="tr-TR" smtClean="0"/>
-              <a:t>17.06.2019</a:t>
+              <a:t>28.07.2019</a:t>
             </a:fld>
             <a:endParaRPr lang="tr-TR"/>
           </a:p>
@@ -2458,7 +2602,7 @@
           <a:p>
             <a:fld id="{BAB971F1-0A24-473E-8A66-D77E329B588E}" type="datetimeFigureOut">
               <a:rPr lang="tr-TR" smtClean="0"/>
-              <a:t>17.06.2019</a:t>
+              <a:t>28.07.2019</a:t>
             </a:fld>
             <a:endParaRPr lang="tr-TR"/>
           </a:p>
@@ -2599,7 +2743,7 @@
           <a:p>
             <a:fld id="{BAB971F1-0A24-473E-8A66-D77E329B588E}" type="datetimeFigureOut">
               <a:rPr lang="tr-TR" smtClean="0"/>
-              <a:t>17.06.2019</a:t>
+              <a:t>28.07.2019</a:t>
             </a:fld>
             <a:endParaRPr lang="tr-TR"/>
           </a:p>
@@ -2712,7 +2856,7 @@
           <a:p>
             <a:fld id="{BAB971F1-0A24-473E-8A66-D77E329B588E}" type="datetimeFigureOut">
               <a:rPr lang="tr-TR" smtClean="0"/>
-              <a:t>17.06.2019</a:t>
+              <a:t>28.07.2019</a:t>
             </a:fld>
             <a:endParaRPr lang="tr-TR"/>
           </a:p>
@@ -3023,7 +3167,7 @@
           <a:p>
             <a:fld id="{BAB971F1-0A24-473E-8A66-D77E329B588E}" type="datetimeFigureOut">
               <a:rPr lang="tr-TR" smtClean="0"/>
-              <a:t>17.06.2019</a:t>
+              <a:t>28.07.2019</a:t>
             </a:fld>
             <a:endParaRPr lang="tr-TR"/>
           </a:p>
@@ -3311,7 +3455,7 @@
           <a:p>
             <a:fld id="{BAB971F1-0A24-473E-8A66-D77E329B588E}" type="datetimeFigureOut">
               <a:rPr lang="tr-TR" smtClean="0"/>
-              <a:t>17.06.2019</a:t>
+              <a:t>28.07.2019</a:t>
             </a:fld>
             <a:endParaRPr lang="tr-TR"/>
           </a:p>
@@ -3552,7 +3696,7 @@
           <a:p>
             <a:fld id="{BAB971F1-0A24-473E-8A66-D77E329B588E}" type="datetimeFigureOut">
               <a:rPr lang="tr-TR" smtClean="0"/>
-              <a:t>17.06.2019</a:t>
+              <a:t>28.07.2019</a:t>
             </a:fld>
             <a:endParaRPr lang="tr-TR"/>
           </a:p>
@@ -4048,20 +4192,6 @@
           <a:lstStyle/>
           <a:p>
             <a:r>
-              <a:rPr lang="tr-TR" sz="4200" b="1" dirty="0" err="1">
-                <a:solidFill>
-                  <a:schemeClr val="accent4">
-                    <a:lumMod val="60000"/>
-                    <a:lumOff val="40000"/>
-                  </a:schemeClr>
-                </a:solidFill>
-                <a:latin typeface="Roboto"/>
-                <a:ea typeface="+mn-ea"/>
-                <a:cs typeface="+mn-cs"/>
-              </a:rPr>
-              <a:t>Uderstanding</a:t>
-            </a:r>
-            <a:r>
               <a:rPr lang="tr-TR" sz="4200" b="1" dirty="0">
                 <a:solidFill>
                   <a:schemeClr val="accent4">
@@ -4073,7 +4203,7 @@
                 <a:ea typeface="+mn-ea"/>
                 <a:cs typeface="+mn-cs"/>
               </a:rPr>
-              <a:t> Machine Learning </a:t>
+              <a:t>Machine Learning </a:t>
             </a:r>
             <a:br>
               <a:rPr lang="tr-TR" sz="4200" b="1" dirty="0">
@@ -4204,7 +4334,7 @@
                 <a:ea typeface="+mn-ea"/>
                 <a:cs typeface="+mn-cs"/>
               </a:rPr>
-              <a:t>Tavsiye Edilen Kaynaklar</a:t>
+              <a:t>ML Tavsiye Edilen Kaynaklar</a:t>
             </a:r>
             <a:endParaRPr lang="en-US" sz="4000" b="1" dirty="0">
               <a:solidFill>
@@ -4363,6 +4493,15 @@
                   <a:srgbClr val="FF4D4D"/>
                 </a:solidFill>
                 <a:latin typeface="Roboto"/>
+              </a:rPr>
+              <a:t>ML </a:t>
+            </a:r>
+            <a:r>
+              <a:rPr lang="tr-TR" sz="4000" b="1" dirty="0">
+                <a:solidFill>
+                  <a:srgbClr val="FF4D4D"/>
+                </a:solidFill>
+                <a:latin typeface="Roboto"/>
                 <a:ea typeface="+mn-ea"/>
                 <a:cs typeface="+mn-cs"/>
               </a:rPr>
@@ -4508,6 +4647,15 @@
                   <a:srgbClr val="FF4D4D"/>
                 </a:solidFill>
                 <a:latin typeface="Roboto"/>
+              </a:rPr>
+              <a:t>ML </a:t>
+            </a:r>
+            <a:r>
+              <a:rPr lang="tr-TR" sz="4000" b="1" dirty="0">
+                <a:solidFill>
+                  <a:srgbClr val="FF4D4D"/>
+                </a:solidFill>
+                <a:latin typeface="Roboto"/>
                 <a:ea typeface="+mn-ea"/>
                 <a:cs typeface="+mn-cs"/>
               </a:rPr>
@@ -5013,6 +5161,1201 @@
   <p:transition spd="slow">
     <p:push dir="u"/>
   </p:transition>
+</p:sld>
+</file>
+
+<file path=ppt/slides/slide13.xml><?xml version="1.0" encoding="utf-8"?>
+<p:sld xmlns:a="http://schemas.openxmlformats.org/drawingml/2006/main" xmlns:r="http://schemas.openxmlformats.org/officeDocument/2006/relationships" xmlns:p="http://schemas.openxmlformats.org/presentationml/2006/main">
+  <p:cSld>
+    <p:spTree>
+      <p:nvGrpSpPr>
+        <p:cNvPr id="1" name=""/>
+        <p:cNvGrpSpPr/>
+        <p:nvPr/>
+      </p:nvGrpSpPr>
+      <p:grpSpPr>
+        <a:xfrm>
+          <a:off x="0" y="0"/>
+          <a:ext cx="0" cy="0"/>
+          <a:chOff x="0" y="0"/>
+          <a:chExt cx="0" cy="0"/>
+        </a:xfrm>
+      </p:grpSpPr>
+      <p:sp>
+        <p:nvSpPr>
+          <p:cNvPr id="3" name="Rectangle 7">
+            <a:extLst>
+              <a:ext uri="{FF2B5EF4-FFF2-40B4-BE49-F238E27FC236}">
+                <a16:creationId xmlns:a16="http://schemas.microsoft.com/office/drawing/2014/main" id="{D42DE1B9-BAF2-438A-99D4-A19B593936A9}"/>
+              </a:ext>
+            </a:extLst>
+          </p:cNvPr>
+          <p:cNvSpPr>
+            <a:spLocks noChangeArrowheads="1"/>
+          </p:cNvSpPr>
+          <p:nvPr/>
+        </p:nvSpPr>
+        <p:spPr bwMode="auto">
+          <a:xfrm>
+            <a:off x="1818167" y="571412"/>
+            <a:ext cx="8429625" cy="590931"/>
+          </a:xfrm>
+          <a:prstGeom prst="rect">
+            <a:avLst/>
+          </a:prstGeom>
+          <a:noFill/>
+          <a:ln>
+            <a:noFill/>
+          </a:ln>
+          <a:extLst>
+            <a:ext uri="{909E8E84-426E-40DD-AFC4-6F175D3DCCD1}">
+              <a14:hiddenFill xmlns:a14="http://schemas.microsoft.com/office/drawing/2010/main">
+                <a:solidFill>
+                  <a:srgbClr val="FFFFFF"/>
+                </a:solidFill>
+              </a14:hiddenFill>
+            </a:ext>
+            <a:ext uri="{91240B29-F687-4F45-9708-019B960494DF}">
+              <a14:hiddenLine xmlns:a14="http://schemas.microsoft.com/office/drawing/2010/main" w="9525">
+                <a:solidFill>
+                  <a:srgbClr val="000000"/>
+                </a:solidFill>
+                <a:miter lim="800000"/>
+                <a:headEnd/>
+                <a:tailEnd/>
+              </a14:hiddenLine>
+            </a:ext>
+          </a:extLst>
+        </p:spPr>
+        <p:txBody>
+          <a:bodyPr>
+            <a:spAutoFit/>
+          </a:bodyPr>
+          <a:lstStyle/>
+          <a:p>
+            <a:pPr marL="0" lvl="1" algn="ctr">
+              <a:lnSpc>
+                <a:spcPct val="90000"/>
+              </a:lnSpc>
+              <a:spcBef>
+                <a:spcPct val="0"/>
+              </a:spcBef>
+            </a:pPr>
+            <a:r>
+              <a:rPr lang="tr-TR" sz="3600" b="1" dirty="0">
+                <a:solidFill>
+                  <a:srgbClr val="FF4D4D"/>
+                </a:solidFill>
+                <a:latin typeface="Roboto"/>
+              </a:rPr>
+              <a:t>DL Tavsiye Edilen Kaynaklar</a:t>
+            </a:r>
+            <a:endParaRPr lang="tr-TR" sz="3600" b="1" dirty="0">
+              <a:solidFill>
+                <a:srgbClr val="FF1F20"/>
+              </a:solidFill>
+              <a:latin typeface="Arial" panose="020B0604020202020204" pitchFamily="34" charset="0"/>
+              <a:ea typeface="Verdana" panose="020B0604030504040204" pitchFamily="34" charset="0"/>
+              <a:cs typeface="Arial" panose="020B0604020202020204" pitchFamily="34" charset="0"/>
+            </a:endParaRPr>
+          </a:p>
+        </p:txBody>
+      </p:sp>
+      <p:pic>
+        <p:nvPicPr>
+          <p:cNvPr id="1026" name="Picture 2" descr="fundamentals of deep learning ile ilgili gÃ¶rsel sonucu">
+            <a:hlinkClick r:id="rId2"/>
+            <a:extLst>
+              <a:ext uri="{FF2B5EF4-FFF2-40B4-BE49-F238E27FC236}">
+                <a16:creationId xmlns:a16="http://schemas.microsoft.com/office/drawing/2014/main" id="{3585B33B-C0EF-4536-A403-9FE13BE4CFC4}"/>
+              </a:ext>
+            </a:extLst>
+          </p:cNvPr>
+          <p:cNvPicPr>
+            <a:picLocks noChangeAspect="1" noChangeArrowheads="1"/>
+          </p:cNvPicPr>
+          <p:nvPr/>
+        </p:nvPicPr>
+        <p:blipFill>
+          <a:blip r:embed="rId3">
+            <a:extLst>
+              <a:ext uri="{28A0092B-C50C-407E-A947-70E740481C1C}">
+                <a14:useLocalDpi xmlns:a14="http://schemas.microsoft.com/office/drawing/2010/main" val="0"/>
+              </a:ext>
+            </a:extLst>
+          </a:blip>
+          <a:srcRect/>
+          <a:stretch>
+            <a:fillRect/>
+          </a:stretch>
+        </p:blipFill>
+        <p:spPr bwMode="auto">
+          <a:xfrm>
+            <a:off x="1199075" y="1421222"/>
+            <a:ext cx="3629025" cy="4752975"/>
+          </a:xfrm>
+          <a:prstGeom prst="rect">
+            <a:avLst/>
+          </a:prstGeom>
+          <a:noFill/>
+          <a:extLst>
+            <a:ext uri="{909E8E84-426E-40DD-AFC4-6F175D3DCCD1}">
+              <a14:hiddenFill xmlns:a14="http://schemas.microsoft.com/office/drawing/2010/main">
+                <a:solidFill>
+                  <a:srgbClr val="FFFFFF"/>
+                </a:solidFill>
+              </a14:hiddenFill>
+            </a:ext>
+          </a:extLst>
+        </p:spPr>
+      </p:pic>
+      <p:pic>
+        <p:nvPicPr>
+          <p:cNvPr id="1028" name="Picture 4" descr="hands on machine learning with scikit learn ile ilgili gÃ¶rsel sonucu">
+            <a:hlinkClick r:id="rId4"/>
+            <a:extLst>
+              <a:ext uri="{FF2B5EF4-FFF2-40B4-BE49-F238E27FC236}">
+                <a16:creationId xmlns:a16="http://schemas.microsoft.com/office/drawing/2014/main" id="{05DDABC5-0EF5-476E-A1F4-7352A9B173A1}"/>
+              </a:ext>
+            </a:extLst>
+          </p:cNvPr>
+          <p:cNvPicPr>
+            <a:picLocks noChangeAspect="1" noChangeArrowheads="1"/>
+          </p:cNvPicPr>
+          <p:nvPr/>
+        </p:nvPicPr>
+        <p:blipFill>
+          <a:blip r:embed="rId5">
+            <a:extLst>
+              <a:ext uri="{28A0092B-C50C-407E-A947-70E740481C1C}">
+                <a14:useLocalDpi xmlns:a14="http://schemas.microsoft.com/office/drawing/2010/main" val="0"/>
+              </a:ext>
+            </a:extLst>
+          </a:blip>
+          <a:srcRect/>
+          <a:stretch>
+            <a:fillRect/>
+          </a:stretch>
+        </p:blipFill>
+        <p:spPr bwMode="auto">
+          <a:xfrm>
+            <a:off x="7363900" y="1303235"/>
+            <a:ext cx="3629025" cy="4762269"/>
+          </a:xfrm>
+          <a:prstGeom prst="rect">
+            <a:avLst/>
+          </a:prstGeom>
+          <a:noFill/>
+          <a:extLst>
+            <a:ext uri="{909E8E84-426E-40DD-AFC4-6F175D3DCCD1}">
+              <a14:hiddenFill xmlns:a14="http://schemas.microsoft.com/office/drawing/2010/main">
+                <a:solidFill>
+                  <a:srgbClr val="FFFFFF"/>
+                </a:solidFill>
+              </a14:hiddenFill>
+            </a:ext>
+          </a:extLst>
+        </p:spPr>
+      </p:pic>
+    </p:spTree>
+    <p:extLst>
+      <p:ext uri="{BB962C8B-B14F-4D97-AF65-F5344CB8AC3E}">
+        <p14:creationId xmlns:p14="http://schemas.microsoft.com/office/powerpoint/2010/main" val="3622917333"/>
+      </p:ext>
+    </p:extLst>
+  </p:cSld>
+  <p:clrMapOvr>
+    <a:masterClrMapping/>
+  </p:clrMapOvr>
+</p:sld>
+</file>
+
+<file path=ppt/slides/slide14.xml><?xml version="1.0" encoding="utf-8"?>
+<p:sld xmlns:a="http://schemas.openxmlformats.org/drawingml/2006/main" xmlns:r="http://schemas.openxmlformats.org/officeDocument/2006/relationships" xmlns:p="http://schemas.openxmlformats.org/presentationml/2006/main">
+  <p:cSld>
+    <p:spTree>
+      <p:nvGrpSpPr>
+        <p:cNvPr id="1" name=""/>
+        <p:cNvGrpSpPr/>
+        <p:nvPr/>
+      </p:nvGrpSpPr>
+      <p:grpSpPr>
+        <a:xfrm>
+          <a:off x="0" y="0"/>
+          <a:ext cx="0" cy="0"/>
+          <a:chOff x="0" y="0"/>
+          <a:chExt cx="0" cy="0"/>
+        </a:xfrm>
+      </p:grpSpPr>
+      <p:sp>
+        <p:nvSpPr>
+          <p:cNvPr id="3" name="Rectangle 7">
+            <a:extLst>
+              <a:ext uri="{FF2B5EF4-FFF2-40B4-BE49-F238E27FC236}">
+                <a16:creationId xmlns:a16="http://schemas.microsoft.com/office/drawing/2014/main" id="{D42DE1B9-BAF2-438A-99D4-A19B593936A9}"/>
+              </a:ext>
+            </a:extLst>
+          </p:cNvPr>
+          <p:cNvSpPr>
+            <a:spLocks noChangeArrowheads="1"/>
+          </p:cNvSpPr>
+          <p:nvPr/>
+        </p:nvSpPr>
+        <p:spPr bwMode="auto">
+          <a:xfrm>
+            <a:off x="1818167" y="571412"/>
+            <a:ext cx="8429625" cy="590931"/>
+          </a:xfrm>
+          <a:prstGeom prst="rect">
+            <a:avLst/>
+          </a:prstGeom>
+          <a:noFill/>
+          <a:ln>
+            <a:noFill/>
+          </a:ln>
+          <a:extLst>
+            <a:ext uri="{909E8E84-426E-40DD-AFC4-6F175D3DCCD1}">
+              <a14:hiddenFill xmlns:a14="http://schemas.microsoft.com/office/drawing/2010/main">
+                <a:solidFill>
+                  <a:srgbClr val="FFFFFF"/>
+                </a:solidFill>
+              </a14:hiddenFill>
+            </a:ext>
+            <a:ext uri="{91240B29-F687-4F45-9708-019B960494DF}">
+              <a14:hiddenLine xmlns:a14="http://schemas.microsoft.com/office/drawing/2010/main" w="9525">
+                <a:solidFill>
+                  <a:srgbClr val="000000"/>
+                </a:solidFill>
+                <a:miter lim="800000"/>
+                <a:headEnd/>
+                <a:tailEnd/>
+              </a14:hiddenLine>
+            </a:ext>
+          </a:extLst>
+        </p:spPr>
+        <p:txBody>
+          <a:bodyPr>
+            <a:spAutoFit/>
+          </a:bodyPr>
+          <a:lstStyle/>
+          <a:p>
+            <a:pPr marL="0" lvl="1" algn="ctr">
+              <a:lnSpc>
+                <a:spcPct val="90000"/>
+              </a:lnSpc>
+              <a:spcBef>
+                <a:spcPct val="0"/>
+              </a:spcBef>
+            </a:pPr>
+            <a:r>
+              <a:rPr lang="tr-TR" sz="3600" b="1" dirty="0">
+                <a:solidFill>
+                  <a:srgbClr val="FF4D4D"/>
+                </a:solidFill>
+                <a:latin typeface="Roboto"/>
+              </a:rPr>
+              <a:t>DL Tavsiye Edilen Kaynaklar</a:t>
+            </a:r>
+            <a:endParaRPr lang="tr-TR" sz="3600" b="1" dirty="0">
+              <a:solidFill>
+                <a:srgbClr val="FF1F20"/>
+              </a:solidFill>
+              <a:latin typeface="Arial" panose="020B0604020202020204" pitchFamily="34" charset="0"/>
+              <a:ea typeface="Verdana" panose="020B0604030504040204" pitchFamily="34" charset="0"/>
+              <a:cs typeface="Arial" panose="020B0604020202020204" pitchFamily="34" charset="0"/>
+            </a:endParaRPr>
+          </a:p>
+        </p:txBody>
+      </p:sp>
+      <p:pic>
+        <p:nvPicPr>
+          <p:cNvPr id="2050" name="Picture 2" descr="deep learning a practitioner's approach ile ilgili gÃ¶rsel sonucu">
+            <a:hlinkClick r:id="rId2"/>
+            <a:extLst>
+              <a:ext uri="{FF2B5EF4-FFF2-40B4-BE49-F238E27FC236}">
+                <a16:creationId xmlns:a16="http://schemas.microsoft.com/office/drawing/2014/main" id="{5465F746-E1D6-4012-B723-22C50E3ED2C9}"/>
+              </a:ext>
+            </a:extLst>
+          </p:cNvPr>
+          <p:cNvPicPr>
+            <a:picLocks noChangeAspect="1" noChangeArrowheads="1"/>
+          </p:cNvPicPr>
+          <p:nvPr/>
+        </p:nvPicPr>
+        <p:blipFill>
+          <a:blip r:embed="rId3">
+            <a:extLst>
+              <a:ext uri="{28A0092B-C50C-407E-A947-70E740481C1C}">
+                <a14:useLocalDpi xmlns:a14="http://schemas.microsoft.com/office/drawing/2010/main" val="0"/>
+              </a:ext>
+            </a:extLst>
+          </a:blip>
+          <a:srcRect/>
+          <a:stretch>
+            <a:fillRect/>
+          </a:stretch>
+        </p:blipFill>
+        <p:spPr bwMode="auto">
+          <a:xfrm>
+            <a:off x="845114" y="1295861"/>
+            <a:ext cx="3629025" cy="4752975"/>
+          </a:xfrm>
+          <a:prstGeom prst="rect">
+            <a:avLst/>
+          </a:prstGeom>
+          <a:noFill/>
+          <a:extLst>
+            <a:ext uri="{909E8E84-426E-40DD-AFC4-6F175D3DCCD1}">
+              <a14:hiddenFill xmlns:a14="http://schemas.microsoft.com/office/drawing/2010/main">
+                <a:solidFill>
+                  <a:srgbClr val="FFFFFF"/>
+                </a:solidFill>
+              </a14:hiddenFill>
+            </a:ext>
+          </a:extLst>
+        </p:spPr>
+      </p:pic>
+      <p:pic>
+        <p:nvPicPr>
+          <p:cNvPr id="2052" name="Picture 4" descr="Deep Learning (Adaptive Computation and Machine Learning series) ile ilgili gÃ¶rsel sonucu">
+            <a:hlinkClick r:id="rId4"/>
+            <a:extLst>
+              <a:ext uri="{FF2B5EF4-FFF2-40B4-BE49-F238E27FC236}">
+                <a16:creationId xmlns:a16="http://schemas.microsoft.com/office/drawing/2014/main" id="{B0E76038-BE77-497C-8DCA-208E5A77FD14}"/>
+              </a:ext>
+            </a:extLst>
+          </p:cNvPr>
+          <p:cNvPicPr>
+            <a:picLocks noChangeAspect="1" noChangeArrowheads="1"/>
+          </p:cNvPicPr>
+          <p:nvPr/>
+        </p:nvPicPr>
+        <p:blipFill>
+          <a:blip r:embed="rId5">
+            <a:extLst>
+              <a:ext uri="{28A0092B-C50C-407E-A947-70E740481C1C}">
+                <a14:useLocalDpi xmlns:a14="http://schemas.microsoft.com/office/drawing/2010/main" val="0"/>
+              </a:ext>
+            </a:extLst>
+          </a:blip>
+          <a:srcRect/>
+          <a:stretch>
+            <a:fillRect/>
+          </a:stretch>
+        </p:blipFill>
+        <p:spPr bwMode="auto">
+          <a:xfrm>
+            <a:off x="6970457" y="1295860"/>
+            <a:ext cx="3619500" cy="4752975"/>
+          </a:xfrm>
+          <a:prstGeom prst="rect">
+            <a:avLst/>
+          </a:prstGeom>
+          <a:noFill/>
+          <a:extLst>
+            <a:ext uri="{909E8E84-426E-40DD-AFC4-6F175D3DCCD1}">
+              <a14:hiddenFill xmlns:a14="http://schemas.microsoft.com/office/drawing/2010/main">
+                <a:solidFill>
+                  <a:srgbClr val="FFFFFF"/>
+                </a:solidFill>
+              </a14:hiddenFill>
+            </a:ext>
+          </a:extLst>
+        </p:spPr>
+      </p:pic>
+    </p:spTree>
+    <p:extLst>
+      <p:ext uri="{BB962C8B-B14F-4D97-AF65-F5344CB8AC3E}">
+        <p14:creationId xmlns:p14="http://schemas.microsoft.com/office/powerpoint/2010/main" val="1361825446"/>
+      </p:ext>
+    </p:extLst>
+  </p:cSld>
+  <p:clrMapOvr>
+    <a:masterClrMapping/>
+  </p:clrMapOvr>
+</p:sld>
+</file>
+
+<file path=ppt/slides/slide15.xml><?xml version="1.0" encoding="utf-8"?>
+<p:sld xmlns:a="http://schemas.openxmlformats.org/drawingml/2006/main" xmlns:r="http://schemas.openxmlformats.org/officeDocument/2006/relationships" xmlns:p="http://schemas.openxmlformats.org/presentationml/2006/main">
+  <p:cSld>
+    <p:spTree>
+      <p:nvGrpSpPr>
+        <p:cNvPr id="1" name=""/>
+        <p:cNvGrpSpPr/>
+        <p:nvPr/>
+      </p:nvGrpSpPr>
+      <p:grpSpPr>
+        <a:xfrm>
+          <a:off x="0" y="0"/>
+          <a:ext cx="0" cy="0"/>
+          <a:chOff x="0" y="0"/>
+          <a:chExt cx="0" cy="0"/>
+        </a:xfrm>
+      </p:grpSpPr>
+      <p:sp>
+        <p:nvSpPr>
+          <p:cNvPr id="3" name="Rectangle 7">
+            <a:extLst>
+              <a:ext uri="{FF2B5EF4-FFF2-40B4-BE49-F238E27FC236}">
+                <a16:creationId xmlns:a16="http://schemas.microsoft.com/office/drawing/2014/main" id="{D42DE1B9-BAF2-438A-99D4-A19B593936A9}"/>
+              </a:ext>
+            </a:extLst>
+          </p:cNvPr>
+          <p:cNvSpPr>
+            <a:spLocks noChangeArrowheads="1"/>
+          </p:cNvSpPr>
+          <p:nvPr/>
+        </p:nvSpPr>
+        <p:spPr bwMode="auto">
+          <a:xfrm>
+            <a:off x="1818167" y="571412"/>
+            <a:ext cx="8429625" cy="590931"/>
+          </a:xfrm>
+          <a:prstGeom prst="rect">
+            <a:avLst/>
+          </a:prstGeom>
+          <a:noFill/>
+          <a:ln>
+            <a:noFill/>
+          </a:ln>
+          <a:extLst>
+            <a:ext uri="{909E8E84-426E-40DD-AFC4-6F175D3DCCD1}">
+              <a14:hiddenFill xmlns:a14="http://schemas.microsoft.com/office/drawing/2010/main">
+                <a:solidFill>
+                  <a:srgbClr val="FFFFFF"/>
+                </a:solidFill>
+              </a14:hiddenFill>
+            </a:ext>
+            <a:ext uri="{91240B29-F687-4F45-9708-019B960494DF}">
+              <a14:hiddenLine xmlns:a14="http://schemas.microsoft.com/office/drawing/2010/main" w="9525">
+                <a:solidFill>
+                  <a:srgbClr val="000000"/>
+                </a:solidFill>
+                <a:miter lim="800000"/>
+                <a:headEnd/>
+                <a:tailEnd/>
+              </a14:hiddenLine>
+            </a:ext>
+          </a:extLst>
+        </p:spPr>
+        <p:txBody>
+          <a:bodyPr>
+            <a:spAutoFit/>
+          </a:bodyPr>
+          <a:lstStyle/>
+          <a:p>
+            <a:pPr marL="0" lvl="1" algn="ctr">
+              <a:lnSpc>
+                <a:spcPct val="90000"/>
+              </a:lnSpc>
+              <a:spcBef>
+                <a:spcPct val="0"/>
+              </a:spcBef>
+            </a:pPr>
+            <a:r>
+              <a:rPr lang="tr-TR" sz="3600" b="1" dirty="0">
+                <a:solidFill>
+                  <a:srgbClr val="FF4D4D"/>
+                </a:solidFill>
+                <a:latin typeface="Roboto"/>
+              </a:rPr>
+              <a:t>DL Tavsiye Edilen Kaynaklar</a:t>
+            </a:r>
+            <a:endParaRPr lang="tr-TR" sz="3600" b="1" dirty="0">
+              <a:solidFill>
+                <a:srgbClr val="FF1F20"/>
+              </a:solidFill>
+              <a:latin typeface="Arial" panose="020B0604020202020204" pitchFamily="34" charset="0"/>
+              <a:ea typeface="Verdana" panose="020B0604030504040204" pitchFamily="34" charset="0"/>
+              <a:cs typeface="Arial" panose="020B0604020202020204" pitchFamily="34" charset="0"/>
+            </a:endParaRPr>
+          </a:p>
+        </p:txBody>
+      </p:sp>
+      <p:pic>
+        <p:nvPicPr>
+          <p:cNvPr id="3074" name="Picture 2" descr="Deep Learning with Python ile ilgili gÃ¶rsel sonucu">
+            <a:hlinkClick r:id="rId2"/>
+            <a:extLst>
+              <a:ext uri="{FF2B5EF4-FFF2-40B4-BE49-F238E27FC236}">
+                <a16:creationId xmlns:a16="http://schemas.microsoft.com/office/drawing/2014/main" id="{C7C9B4CE-5AD1-4D24-AD9E-6352CB9AB2E7}"/>
+              </a:ext>
+            </a:extLst>
+          </p:cNvPr>
+          <p:cNvPicPr>
+            <a:picLocks noChangeAspect="1" noChangeArrowheads="1"/>
+          </p:cNvPicPr>
+          <p:nvPr/>
+        </p:nvPicPr>
+        <p:blipFill>
+          <a:blip r:embed="rId3">
+            <a:extLst>
+              <a:ext uri="{28A0092B-C50C-407E-A947-70E740481C1C}">
+                <a14:useLocalDpi xmlns:a14="http://schemas.microsoft.com/office/drawing/2010/main" val="0"/>
+              </a:ext>
+            </a:extLst>
+          </a:blip>
+          <a:srcRect/>
+          <a:stretch>
+            <a:fillRect/>
+          </a:stretch>
+        </p:blipFill>
+        <p:spPr bwMode="auto">
+          <a:xfrm>
+            <a:off x="772445" y="1309763"/>
+            <a:ext cx="3790185" cy="4737732"/>
+          </a:xfrm>
+          <a:prstGeom prst="rect">
+            <a:avLst/>
+          </a:prstGeom>
+          <a:noFill/>
+          <a:extLst>
+            <a:ext uri="{909E8E84-426E-40DD-AFC4-6F175D3DCCD1}">
+              <a14:hiddenFill xmlns:a14="http://schemas.microsoft.com/office/drawing/2010/main">
+                <a:solidFill>
+                  <a:srgbClr val="FFFFFF"/>
+                </a:solidFill>
+              </a14:hiddenFill>
+            </a:ext>
+          </a:extLst>
+        </p:spPr>
+      </p:pic>
+      <p:pic>
+        <p:nvPicPr>
+          <p:cNvPr id="3076" name="Picture 4" descr="Deep Learning for the Life Sciences ile ilgili gÃ¶rsel sonucu">
+            <a:hlinkClick r:id="rId4"/>
+            <a:extLst>
+              <a:ext uri="{FF2B5EF4-FFF2-40B4-BE49-F238E27FC236}">
+                <a16:creationId xmlns:a16="http://schemas.microsoft.com/office/drawing/2014/main" id="{F651E65C-66F5-43A6-9EFE-3284259EABBA}"/>
+              </a:ext>
+            </a:extLst>
+          </p:cNvPr>
+          <p:cNvPicPr>
+            <a:picLocks noChangeAspect="1" noChangeArrowheads="1"/>
+          </p:cNvPicPr>
+          <p:nvPr/>
+        </p:nvPicPr>
+        <p:blipFill>
+          <a:blip r:embed="rId5">
+            <a:extLst>
+              <a:ext uri="{28A0092B-C50C-407E-A947-70E740481C1C}">
+                <a14:useLocalDpi xmlns:a14="http://schemas.microsoft.com/office/drawing/2010/main" val="0"/>
+              </a:ext>
+            </a:extLst>
+          </a:blip>
+          <a:srcRect/>
+          <a:stretch>
+            <a:fillRect/>
+          </a:stretch>
+        </p:blipFill>
+        <p:spPr bwMode="auto">
+          <a:xfrm>
+            <a:off x="7629371" y="1309763"/>
+            <a:ext cx="3629025" cy="4752975"/>
+          </a:xfrm>
+          <a:prstGeom prst="rect">
+            <a:avLst/>
+          </a:prstGeom>
+          <a:noFill/>
+          <a:extLst>
+            <a:ext uri="{909E8E84-426E-40DD-AFC4-6F175D3DCCD1}">
+              <a14:hiddenFill xmlns:a14="http://schemas.microsoft.com/office/drawing/2010/main">
+                <a:solidFill>
+                  <a:srgbClr val="FFFFFF"/>
+                </a:solidFill>
+              </a14:hiddenFill>
+            </a:ext>
+          </a:extLst>
+        </p:spPr>
+      </p:pic>
+    </p:spTree>
+    <p:extLst>
+      <p:ext uri="{BB962C8B-B14F-4D97-AF65-F5344CB8AC3E}">
+        <p14:creationId xmlns:p14="http://schemas.microsoft.com/office/powerpoint/2010/main" val="1541464282"/>
+      </p:ext>
+    </p:extLst>
+  </p:cSld>
+  <p:clrMapOvr>
+    <a:masterClrMapping/>
+  </p:clrMapOvr>
+</p:sld>
+</file>
+
+<file path=ppt/slides/slide16.xml><?xml version="1.0" encoding="utf-8"?>
+<p:sld xmlns:a="http://schemas.openxmlformats.org/drawingml/2006/main" xmlns:r="http://schemas.openxmlformats.org/officeDocument/2006/relationships" xmlns:p="http://schemas.openxmlformats.org/presentationml/2006/main">
+  <p:cSld>
+    <p:spTree>
+      <p:nvGrpSpPr>
+        <p:cNvPr id="1" name=""/>
+        <p:cNvGrpSpPr/>
+        <p:nvPr/>
+      </p:nvGrpSpPr>
+      <p:grpSpPr>
+        <a:xfrm>
+          <a:off x="0" y="0"/>
+          <a:ext cx="0" cy="0"/>
+          <a:chOff x="0" y="0"/>
+          <a:chExt cx="0" cy="0"/>
+        </a:xfrm>
+      </p:grpSpPr>
+      <p:sp>
+        <p:nvSpPr>
+          <p:cNvPr id="3" name="Rectangle 7">
+            <a:extLst>
+              <a:ext uri="{FF2B5EF4-FFF2-40B4-BE49-F238E27FC236}">
+                <a16:creationId xmlns:a16="http://schemas.microsoft.com/office/drawing/2014/main" id="{D42DE1B9-BAF2-438A-99D4-A19B593936A9}"/>
+              </a:ext>
+            </a:extLst>
+          </p:cNvPr>
+          <p:cNvSpPr>
+            <a:spLocks noChangeArrowheads="1"/>
+          </p:cNvSpPr>
+          <p:nvPr/>
+        </p:nvSpPr>
+        <p:spPr bwMode="auto">
+          <a:xfrm>
+            <a:off x="1818167" y="571412"/>
+            <a:ext cx="8429625" cy="590931"/>
+          </a:xfrm>
+          <a:prstGeom prst="rect">
+            <a:avLst/>
+          </a:prstGeom>
+          <a:noFill/>
+          <a:ln>
+            <a:noFill/>
+          </a:ln>
+          <a:extLst>
+            <a:ext uri="{909E8E84-426E-40DD-AFC4-6F175D3DCCD1}">
+              <a14:hiddenFill xmlns:a14="http://schemas.microsoft.com/office/drawing/2010/main">
+                <a:solidFill>
+                  <a:srgbClr val="FFFFFF"/>
+                </a:solidFill>
+              </a14:hiddenFill>
+            </a:ext>
+            <a:ext uri="{91240B29-F687-4F45-9708-019B960494DF}">
+              <a14:hiddenLine xmlns:a14="http://schemas.microsoft.com/office/drawing/2010/main" w="9525">
+                <a:solidFill>
+                  <a:srgbClr val="000000"/>
+                </a:solidFill>
+                <a:miter lim="800000"/>
+                <a:headEnd/>
+                <a:tailEnd/>
+              </a14:hiddenLine>
+            </a:ext>
+          </a:extLst>
+        </p:spPr>
+        <p:txBody>
+          <a:bodyPr>
+            <a:spAutoFit/>
+          </a:bodyPr>
+          <a:lstStyle/>
+          <a:p>
+            <a:pPr marL="0" lvl="1" algn="ctr">
+              <a:lnSpc>
+                <a:spcPct val="90000"/>
+              </a:lnSpc>
+              <a:spcBef>
+                <a:spcPct val="0"/>
+              </a:spcBef>
+            </a:pPr>
+            <a:r>
+              <a:rPr lang="tr-TR" sz="3600" b="1" dirty="0">
+                <a:solidFill>
+                  <a:srgbClr val="FF1F20"/>
+                </a:solidFill>
+                <a:latin typeface="Arial" panose="020B0604020202020204" pitchFamily="34" charset="0"/>
+                <a:ea typeface="Verdana" panose="020B0604030504040204" pitchFamily="34" charset="0"/>
+                <a:cs typeface="Arial" panose="020B0604020202020204" pitchFamily="34" charset="0"/>
+              </a:rPr>
+              <a:t>DL KAYNAKLAR – UDEMY KURSLARI</a:t>
+            </a:r>
+          </a:p>
+        </p:txBody>
+      </p:sp>
+      <p:pic>
+        <p:nvPicPr>
+          <p:cNvPr id="5" name="Resim 4">
+            <a:hlinkClick r:id="rId2"/>
+            <a:extLst>
+              <a:ext uri="{FF2B5EF4-FFF2-40B4-BE49-F238E27FC236}">
+                <a16:creationId xmlns:a16="http://schemas.microsoft.com/office/drawing/2014/main" id="{687D2270-0E17-4A86-BCFC-BA0AD05953E5}"/>
+              </a:ext>
+            </a:extLst>
+          </p:cNvPr>
+          <p:cNvPicPr>
+            <a:picLocks noChangeAspect="1"/>
+          </p:cNvPicPr>
+          <p:nvPr/>
+        </p:nvPicPr>
+        <p:blipFill>
+          <a:blip r:embed="rId3"/>
+          <a:stretch>
+            <a:fillRect/>
+          </a:stretch>
+        </p:blipFill>
+        <p:spPr>
+          <a:xfrm>
+            <a:off x="1563411" y="2001601"/>
+            <a:ext cx="8939136" cy="3240000"/>
+          </a:xfrm>
+          <a:prstGeom prst="rect">
+            <a:avLst/>
+          </a:prstGeom>
+        </p:spPr>
+      </p:pic>
+    </p:spTree>
+    <p:extLst>
+      <p:ext uri="{BB962C8B-B14F-4D97-AF65-F5344CB8AC3E}">
+        <p14:creationId xmlns:p14="http://schemas.microsoft.com/office/powerpoint/2010/main" val="2865463576"/>
+      </p:ext>
+    </p:extLst>
+  </p:cSld>
+  <p:clrMapOvr>
+    <a:masterClrMapping/>
+  </p:clrMapOvr>
+</p:sld>
+</file>
+
+<file path=ppt/slides/slide17.xml><?xml version="1.0" encoding="utf-8"?>
+<p:sld xmlns:a="http://schemas.openxmlformats.org/drawingml/2006/main" xmlns:r="http://schemas.openxmlformats.org/officeDocument/2006/relationships" xmlns:p="http://schemas.openxmlformats.org/presentationml/2006/main">
+  <p:cSld>
+    <p:spTree>
+      <p:nvGrpSpPr>
+        <p:cNvPr id="1" name=""/>
+        <p:cNvGrpSpPr/>
+        <p:nvPr/>
+      </p:nvGrpSpPr>
+      <p:grpSpPr>
+        <a:xfrm>
+          <a:off x="0" y="0"/>
+          <a:ext cx="0" cy="0"/>
+          <a:chOff x="0" y="0"/>
+          <a:chExt cx="0" cy="0"/>
+        </a:xfrm>
+      </p:grpSpPr>
+      <p:sp>
+        <p:nvSpPr>
+          <p:cNvPr id="3" name="Rectangle 7">
+            <a:extLst>
+              <a:ext uri="{FF2B5EF4-FFF2-40B4-BE49-F238E27FC236}">
+                <a16:creationId xmlns:a16="http://schemas.microsoft.com/office/drawing/2014/main" id="{D42DE1B9-BAF2-438A-99D4-A19B593936A9}"/>
+              </a:ext>
+            </a:extLst>
+          </p:cNvPr>
+          <p:cNvSpPr>
+            <a:spLocks noChangeArrowheads="1"/>
+          </p:cNvSpPr>
+          <p:nvPr/>
+        </p:nvSpPr>
+        <p:spPr bwMode="auto">
+          <a:xfrm>
+            <a:off x="1818167" y="571412"/>
+            <a:ext cx="8429625" cy="590931"/>
+          </a:xfrm>
+          <a:prstGeom prst="rect">
+            <a:avLst/>
+          </a:prstGeom>
+          <a:noFill/>
+          <a:ln>
+            <a:noFill/>
+          </a:ln>
+          <a:extLst>
+            <a:ext uri="{909E8E84-426E-40DD-AFC4-6F175D3DCCD1}">
+              <a14:hiddenFill xmlns:a14="http://schemas.microsoft.com/office/drawing/2010/main">
+                <a:solidFill>
+                  <a:srgbClr val="FFFFFF"/>
+                </a:solidFill>
+              </a14:hiddenFill>
+            </a:ext>
+            <a:ext uri="{91240B29-F687-4F45-9708-019B960494DF}">
+              <a14:hiddenLine xmlns:a14="http://schemas.microsoft.com/office/drawing/2010/main" w="9525">
+                <a:solidFill>
+                  <a:srgbClr val="000000"/>
+                </a:solidFill>
+                <a:miter lim="800000"/>
+                <a:headEnd/>
+                <a:tailEnd/>
+              </a14:hiddenLine>
+            </a:ext>
+          </a:extLst>
+        </p:spPr>
+        <p:txBody>
+          <a:bodyPr>
+            <a:spAutoFit/>
+          </a:bodyPr>
+          <a:lstStyle/>
+          <a:p>
+            <a:pPr marL="0" lvl="1" algn="ctr">
+              <a:lnSpc>
+                <a:spcPct val="90000"/>
+              </a:lnSpc>
+              <a:spcBef>
+                <a:spcPct val="0"/>
+              </a:spcBef>
+            </a:pPr>
+            <a:r>
+              <a:rPr lang="tr-TR" sz="3600" b="1" dirty="0">
+                <a:solidFill>
+                  <a:srgbClr val="FF1F20"/>
+                </a:solidFill>
+                <a:latin typeface="Arial" panose="020B0604020202020204" pitchFamily="34" charset="0"/>
+                <a:ea typeface="Verdana" panose="020B0604030504040204" pitchFamily="34" charset="0"/>
+                <a:cs typeface="Arial" panose="020B0604020202020204" pitchFamily="34" charset="0"/>
+              </a:rPr>
+              <a:t>DL KAYNAKLAR – UDEMY KURSLARI</a:t>
+            </a:r>
+          </a:p>
+        </p:txBody>
+      </p:sp>
+      <p:pic>
+        <p:nvPicPr>
+          <p:cNvPr id="4" name="Resim 3">
+            <a:hlinkClick r:id="rId2"/>
+            <a:extLst>
+              <a:ext uri="{FF2B5EF4-FFF2-40B4-BE49-F238E27FC236}">
+                <a16:creationId xmlns:a16="http://schemas.microsoft.com/office/drawing/2014/main" id="{529DF1A4-B0D4-40AC-B1D3-13B650213D01}"/>
+              </a:ext>
+            </a:extLst>
+          </p:cNvPr>
+          <p:cNvPicPr>
+            <a:picLocks noChangeAspect="1"/>
+          </p:cNvPicPr>
+          <p:nvPr/>
+        </p:nvPicPr>
+        <p:blipFill>
+          <a:blip r:embed="rId3"/>
+          <a:stretch>
+            <a:fillRect/>
+          </a:stretch>
+        </p:blipFill>
+        <p:spPr>
+          <a:xfrm>
+            <a:off x="1356935" y="2202398"/>
+            <a:ext cx="9352088" cy="3240000"/>
+          </a:xfrm>
+          <a:prstGeom prst="rect">
+            <a:avLst/>
+          </a:prstGeom>
+        </p:spPr>
+      </p:pic>
+    </p:spTree>
+    <p:extLst>
+      <p:ext uri="{BB962C8B-B14F-4D97-AF65-F5344CB8AC3E}">
+        <p14:creationId xmlns:p14="http://schemas.microsoft.com/office/powerpoint/2010/main" val="2593947091"/>
+      </p:ext>
+    </p:extLst>
+  </p:cSld>
+  <p:clrMapOvr>
+    <a:masterClrMapping/>
+  </p:clrMapOvr>
+</p:sld>
+</file>
+
+<file path=ppt/slides/slide18.xml><?xml version="1.0" encoding="utf-8"?>
+<p:sld xmlns:a="http://schemas.openxmlformats.org/drawingml/2006/main" xmlns:r="http://schemas.openxmlformats.org/officeDocument/2006/relationships" xmlns:p="http://schemas.openxmlformats.org/presentationml/2006/main">
+  <p:cSld>
+    <p:spTree>
+      <p:nvGrpSpPr>
+        <p:cNvPr id="1" name=""/>
+        <p:cNvGrpSpPr/>
+        <p:nvPr/>
+      </p:nvGrpSpPr>
+      <p:grpSpPr>
+        <a:xfrm>
+          <a:off x="0" y="0"/>
+          <a:ext cx="0" cy="0"/>
+          <a:chOff x="0" y="0"/>
+          <a:chExt cx="0" cy="0"/>
+        </a:xfrm>
+      </p:grpSpPr>
+      <p:sp>
+        <p:nvSpPr>
+          <p:cNvPr id="3" name="Rectangle 7">
+            <a:extLst>
+              <a:ext uri="{FF2B5EF4-FFF2-40B4-BE49-F238E27FC236}">
+                <a16:creationId xmlns:a16="http://schemas.microsoft.com/office/drawing/2014/main" id="{D42DE1B9-BAF2-438A-99D4-A19B593936A9}"/>
+              </a:ext>
+            </a:extLst>
+          </p:cNvPr>
+          <p:cNvSpPr>
+            <a:spLocks noChangeArrowheads="1"/>
+          </p:cNvSpPr>
+          <p:nvPr/>
+        </p:nvSpPr>
+        <p:spPr bwMode="auto">
+          <a:xfrm>
+            <a:off x="1818167" y="571412"/>
+            <a:ext cx="8429625" cy="590931"/>
+          </a:xfrm>
+          <a:prstGeom prst="rect">
+            <a:avLst/>
+          </a:prstGeom>
+          <a:noFill/>
+          <a:ln>
+            <a:noFill/>
+          </a:ln>
+          <a:extLst>
+            <a:ext uri="{909E8E84-426E-40DD-AFC4-6F175D3DCCD1}">
+              <a14:hiddenFill xmlns:a14="http://schemas.microsoft.com/office/drawing/2010/main">
+                <a:solidFill>
+                  <a:srgbClr val="FFFFFF"/>
+                </a:solidFill>
+              </a14:hiddenFill>
+            </a:ext>
+            <a:ext uri="{91240B29-F687-4F45-9708-019B960494DF}">
+              <a14:hiddenLine xmlns:a14="http://schemas.microsoft.com/office/drawing/2010/main" w="9525">
+                <a:solidFill>
+                  <a:srgbClr val="000000"/>
+                </a:solidFill>
+                <a:miter lim="800000"/>
+                <a:headEnd/>
+                <a:tailEnd/>
+              </a14:hiddenLine>
+            </a:ext>
+          </a:extLst>
+        </p:spPr>
+        <p:txBody>
+          <a:bodyPr>
+            <a:spAutoFit/>
+          </a:bodyPr>
+          <a:lstStyle/>
+          <a:p>
+            <a:pPr marL="0" lvl="1" algn="ctr">
+              <a:lnSpc>
+                <a:spcPct val="90000"/>
+              </a:lnSpc>
+              <a:spcBef>
+                <a:spcPct val="0"/>
+              </a:spcBef>
+            </a:pPr>
+            <a:r>
+              <a:rPr lang="tr-TR" sz="3600" b="1" dirty="0">
+                <a:solidFill>
+                  <a:srgbClr val="FF1F20"/>
+                </a:solidFill>
+                <a:latin typeface="Arial" panose="020B0604020202020204" pitchFamily="34" charset="0"/>
+                <a:ea typeface="Verdana" panose="020B0604030504040204" pitchFamily="34" charset="0"/>
+                <a:cs typeface="Arial" panose="020B0604020202020204" pitchFamily="34" charset="0"/>
+              </a:rPr>
+              <a:t>DL KAYNAKLAR – UDEMY KURSLARI</a:t>
+            </a:r>
+          </a:p>
+        </p:txBody>
+      </p:sp>
+      <p:pic>
+        <p:nvPicPr>
+          <p:cNvPr id="5" name="Resim 4">
+            <a:hlinkClick r:id="rId2"/>
+            <a:extLst>
+              <a:ext uri="{FF2B5EF4-FFF2-40B4-BE49-F238E27FC236}">
+                <a16:creationId xmlns:a16="http://schemas.microsoft.com/office/drawing/2014/main" id="{C83AF47C-8E9D-46D2-828D-D8641ADFDB6E}"/>
+              </a:ext>
+            </a:extLst>
+          </p:cNvPr>
+          <p:cNvPicPr>
+            <a:picLocks noChangeAspect="1"/>
+          </p:cNvPicPr>
+          <p:nvPr/>
+        </p:nvPicPr>
+        <p:blipFill>
+          <a:blip r:embed="rId3"/>
+          <a:stretch>
+            <a:fillRect/>
+          </a:stretch>
+        </p:blipFill>
+        <p:spPr>
+          <a:xfrm>
+            <a:off x="1862400" y="2000049"/>
+            <a:ext cx="8467199" cy="3240000"/>
+          </a:xfrm>
+          <a:prstGeom prst="rect">
+            <a:avLst/>
+          </a:prstGeom>
+        </p:spPr>
+      </p:pic>
+      <p:sp>
+        <p:nvSpPr>
+          <p:cNvPr id="2" name="Dikdörtgen 1">
+            <a:extLst>
+              <a:ext uri="{FF2B5EF4-FFF2-40B4-BE49-F238E27FC236}">
+                <a16:creationId xmlns:a16="http://schemas.microsoft.com/office/drawing/2014/main" id="{3899DF63-61A8-4B86-AF5F-5177C3AAE102}"/>
+              </a:ext>
+            </a:extLst>
+          </p:cNvPr>
+          <p:cNvSpPr/>
+          <p:nvPr/>
+        </p:nvSpPr>
+        <p:spPr>
+          <a:xfrm>
+            <a:off x="3143245" y="5488771"/>
+            <a:ext cx="5573000" cy="369332"/>
+          </a:xfrm>
+          <a:prstGeom prst="rect">
+            <a:avLst/>
+          </a:prstGeom>
+        </p:spPr>
+        <p:txBody>
+          <a:bodyPr wrap="none">
+            <a:spAutoFit/>
+          </a:bodyPr>
+          <a:lstStyle/>
+          <a:p>
+            <a:r>
+              <a:rPr lang="tr-TR" dirty="0">
+                <a:hlinkClick r:id="rId4"/>
+              </a:rPr>
+              <a:t>https://www.superdatascience.com/pages/deep-learning</a:t>
+            </a:r>
+            <a:endParaRPr lang="tr-TR" dirty="0"/>
+          </a:p>
+        </p:txBody>
+      </p:sp>
+    </p:spTree>
+    <p:extLst>
+      <p:ext uri="{BB962C8B-B14F-4D97-AF65-F5344CB8AC3E}">
+        <p14:creationId xmlns:p14="http://schemas.microsoft.com/office/powerpoint/2010/main" val="2632417626"/>
+      </p:ext>
+    </p:extLst>
+  </p:cSld>
+  <p:clrMapOvr>
+    <a:masterClrMapping/>
+  </p:clrMapOvr>
+</p:sld>
+</file>
+
+<file path=ppt/slides/slide19.xml><?xml version="1.0" encoding="utf-8"?>
+<p:sld xmlns:a="http://schemas.openxmlformats.org/drawingml/2006/main" xmlns:r="http://schemas.openxmlformats.org/officeDocument/2006/relationships" xmlns:p="http://schemas.openxmlformats.org/presentationml/2006/main">
+  <p:cSld>
+    <p:spTree>
+      <p:nvGrpSpPr>
+        <p:cNvPr id="1" name=""/>
+        <p:cNvGrpSpPr/>
+        <p:nvPr/>
+      </p:nvGrpSpPr>
+      <p:grpSpPr>
+        <a:xfrm>
+          <a:off x="0" y="0"/>
+          <a:ext cx="0" cy="0"/>
+          <a:chOff x="0" y="0"/>
+          <a:chExt cx="0" cy="0"/>
+        </a:xfrm>
+      </p:grpSpPr>
+      <p:sp>
+        <p:nvSpPr>
+          <p:cNvPr id="3" name="Rectangle 7">
+            <a:extLst>
+              <a:ext uri="{FF2B5EF4-FFF2-40B4-BE49-F238E27FC236}">
+                <a16:creationId xmlns:a16="http://schemas.microsoft.com/office/drawing/2014/main" id="{D42DE1B9-BAF2-438A-99D4-A19B593936A9}"/>
+              </a:ext>
+            </a:extLst>
+          </p:cNvPr>
+          <p:cNvSpPr>
+            <a:spLocks noChangeArrowheads="1"/>
+          </p:cNvSpPr>
+          <p:nvPr/>
+        </p:nvSpPr>
+        <p:spPr bwMode="auto">
+          <a:xfrm>
+            <a:off x="1818167" y="571412"/>
+            <a:ext cx="8429625" cy="590931"/>
+          </a:xfrm>
+          <a:prstGeom prst="rect">
+            <a:avLst/>
+          </a:prstGeom>
+          <a:noFill/>
+          <a:ln>
+            <a:noFill/>
+          </a:ln>
+          <a:extLst>
+            <a:ext uri="{909E8E84-426E-40DD-AFC4-6F175D3DCCD1}">
+              <a14:hiddenFill xmlns:a14="http://schemas.microsoft.com/office/drawing/2010/main">
+                <a:solidFill>
+                  <a:srgbClr val="FFFFFF"/>
+                </a:solidFill>
+              </a14:hiddenFill>
+            </a:ext>
+            <a:ext uri="{91240B29-F687-4F45-9708-019B960494DF}">
+              <a14:hiddenLine xmlns:a14="http://schemas.microsoft.com/office/drawing/2010/main" w="9525">
+                <a:solidFill>
+                  <a:srgbClr val="000000"/>
+                </a:solidFill>
+                <a:miter lim="800000"/>
+                <a:headEnd/>
+                <a:tailEnd/>
+              </a14:hiddenLine>
+            </a:ext>
+          </a:extLst>
+        </p:spPr>
+        <p:txBody>
+          <a:bodyPr>
+            <a:spAutoFit/>
+          </a:bodyPr>
+          <a:lstStyle/>
+          <a:p>
+            <a:pPr marL="0" lvl="1" algn="ctr">
+              <a:lnSpc>
+                <a:spcPct val="90000"/>
+              </a:lnSpc>
+              <a:spcBef>
+                <a:spcPct val="0"/>
+              </a:spcBef>
+            </a:pPr>
+            <a:r>
+              <a:rPr lang="tr-TR" sz="3600" b="1" dirty="0">
+                <a:solidFill>
+                  <a:srgbClr val="FF1F20"/>
+                </a:solidFill>
+                <a:latin typeface="Arial" panose="020B0604020202020204" pitchFamily="34" charset="0"/>
+                <a:ea typeface="Verdana" panose="020B0604030504040204" pitchFamily="34" charset="0"/>
+                <a:cs typeface="Arial" panose="020B0604020202020204" pitchFamily="34" charset="0"/>
+              </a:rPr>
+              <a:t>DL KAYNAKLAR – UDEMY KURSLARI</a:t>
+            </a:r>
+          </a:p>
+        </p:txBody>
+      </p:sp>
+      <p:pic>
+        <p:nvPicPr>
+          <p:cNvPr id="2" name="Resim 1">
+            <a:hlinkClick r:id="rId2"/>
+            <a:extLst>
+              <a:ext uri="{FF2B5EF4-FFF2-40B4-BE49-F238E27FC236}">
+                <a16:creationId xmlns:a16="http://schemas.microsoft.com/office/drawing/2014/main" id="{241013FF-291F-4AD0-A7E5-5B46EE121F18}"/>
+              </a:ext>
+            </a:extLst>
+          </p:cNvPr>
+          <p:cNvPicPr>
+            <a:picLocks noChangeAspect="1"/>
+          </p:cNvPicPr>
+          <p:nvPr/>
+        </p:nvPicPr>
+        <p:blipFill>
+          <a:blip r:embed="rId3"/>
+          <a:stretch>
+            <a:fillRect/>
+          </a:stretch>
+        </p:blipFill>
+        <p:spPr>
+          <a:xfrm>
+            <a:off x="1818166" y="1842962"/>
+            <a:ext cx="8738874" cy="3240000"/>
+          </a:xfrm>
+          <a:prstGeom prst="rect">
+            <a:avLst/>
+          </a:prstGeom>
+        </p:spPr>
+      </p:pic>
+    </p:spTree>
+    <p:extLst>
+      <p:ext uri="{BB962C8B-B14F-4D97-AF65-F5344CB8AC3E}">
+        <p14:creationId xmlns:p14="http://schemas.microsoft.com/office/powerpoint/2010/main" val="2030863806"/>
+      </p:ext>
+    </p:extLst>
+  </p:cSld>
+  <p:clrMapOvr>
+    <a:masterClrMapping/>
+  </p:clrMapOvr>
 </p:sld>
 </file>
 
@@ -5361,6 +6704,262 @@
   <p:transition spd="slow">
     <p:push dir="u"/>
   </p:transition>
+</p:sld>
+</file>
+
+<file path=ppt/slides/slide20.xml><?xml version="1.0" encoding="utf-8"?>
+<p:sld xmlns:a="http://schemas.openxmlformats.org/drawingml/2006/main" xmlns:r="http://schemas.openxmlformats.org/officeDocument/2006/relationships" xmlns:p="http://schemas.openxmlformats.org/presentationml/2006/main">
+  <p:cSld>
+    <p:spTree>
+      <p:nvGrpSpPr>
+        <p:cNvPr id="1" name=""/>
+        <p:cNvGrpSpPr/>
+        <p:nvPr/>
+      </p:nvGrpSpPr>
+      <p:grpSpPr>
+        <a:xfrm>
+          <a:off x="0" y="0"/>
+          <a:ext cx="0" cy="0"/>
+          <a:chOff x="0" y="0"/>
+          <a:chExt cx="0" cy="0"/>
+        </a:xfrm>
+      </p:grpSpPr>
+      <p:sp>
+        <p:nvSpPr>
+          <p:cNvPr id="2" name="Dikdörtgen 1">
+            <a:extLst>
+              <a:ext uri="{FF2B5EF4-FFF2-40B4-BE49-F238E27FC236}">
+                <a16:creationId xmlns:a16="http://schemas.microsoft.com/office/drawing/2014/main" id="{9E7DAE9A-5611-476C-9343-F8F6556FE056}"/>
+              </a:ext>
+            </a:extLst>
+          </p:cNvPr>
+          <p:cNvSpPr/>
+          <p:nvPr/>
+        </p:nvSpPr>
+        <p:spPr>
+          <a:xfrm>
+            <a:off x="1002890" y="1162343"/>
+            <a:ext cx="10707330" cy="1384995"/>
+          </a:xfrm>
+          <a:prstGeom prst="rect">
+            <a:avLst/>
+          </a:prstGeom>
+        </p:spPr>
+        <p:txBody>
+          <a:bodyPr wrap="square">
+            <a:spAutoFit/>
+          </a:bodyPr>
+          <a:lstStyle/>
+          <a:p>
+            <a:pPr marL="457200" indent="-457200">
+              <a:buFont typeface="Arial" panose="020B0604020202020204" pitchFamily="34" charset="0"/>
+              <a:buChar char="•"/>
+            </a:pPr>
+            <a:r>
+              <a:rPr lang="tr-TR" sz="2800" dirty="0">
+                <a:solidFill>
+                  <a:srgbClr val="0070C0"/>
+                </a:solidFill>
+                <a:latin typeface="Roboto"/>
+              </a:rPr>
+              <a:t>Şeker, Abdulkadir, Banu Diri, </a:t>
+            </a:r>
+            <a:r>
+              <a:rPr lang="tr-TR" sz="2800" dirty="0" err="1">
+                <a:solidFill>
+                  <a:srgbClr val="0070C0"/>
+                </a:solidFill>
+                <a:latin typeface="Roboto"/>
+              </a:rPr>
+              <a:t>and</a:t>
+            </a:r>
+            <a:r>
+              <a:rPr lang="tr-TR" sz="2800" dirty="0">
+                <a:solidFill>
+                  <a:srgbClr val="0070C0"/>
+                </a:solidFill>
+                <a:latin typeface="Roboto"/>
+              </a:rPr>
+              <a:t> Hasan Hüseyin Balık. "Derin Öğrenme Yöntemleri ve Uygulamaları Hakkında Bir İnceleme." Gazi Mühendislik Bilimleri Dergisi (GMBD) 3.3 (2017): 47-64.</a:t>
+            </a:r>
+          </a:p>
+        </p:txBody>
+      </p:sp>
+      <p:sp>
+        <p:nvSpPr>
+          <p:cNvPr id="3" name="Rectangle 7">
+            <a:extLst>
+              <a:ext uri="{FF2B5EF4-FFF2-40B4-BE49-F238E27FC236}">
+                <a16:creationId xmlns:a16="http://schemas.microsoft.com/office/drawing/2014/main" id="{D42DE1B9-BAF2-438A-99D4-A19B593936A9}"/>
+              </a:ext>
+            </a:extLst>
+          </p:cNvPr>
+          <p:cNvSpPr>
+            <a:spLocks noChangeArrowheads="1"/>
+          </p:cNvSpPr>
+          <p:nvPr/>
+        </p:nvSpPr>
+        <p:spPr bwMode="auto">
+          <a:xfrm>
+            <a:off x="1818167" y="571412"/>
+            <a:ext cx="8429625" cy="590931"/>
+          </a:xfrm>
+          <a:prstGeom prst="rect">
+            <a:avLst/>
+          </a:prstGeom>
+          <a:noFill/>
+          <a:ln>
+            <a:noFill/>
+          </a:ln>
+          <a:extLst>
+            <a:ext uri="{909E8E84-426E-40DD-AFC4-6F175D3DCCD1}">
+              <a14:hiddenFill xmlns:a14="http://schemas.microsoft.com/office/drawing/2010/main">
+                <a:solidFill>
+                  <a:srgbClr val="FFFFFF"/>
+                </a:solidFill>
+              </a14:hiddenFill>
+            </a:ext>
+            <a:ext uri="{91240B29-F687-4F45-9708-019B960494DF}">
+              <a14:hiddenLine xmlns:a14="http://schemas.microsoft.com/office/drawing/2010/main" w="9525">
+                <a:solidFill>
+                  <a:srgbClr val="000000"/>
+                </a:solidFill>
+                <a:miter lim="800000"/>
+                <a:headEnd/>
+                <a:tailEnd/>
+              </a14:hiddenLine>
+            </a:ext>
+          </a:extLst>
+        </p:spPr>
+        <p:txBody>
+          <a:bodyPr>
+            <a:spAutoFit/>
+          </a:bodyPr>
+          <a:lstStyle/>
+          <a:p>
+            <a:pPr marL="0" lvl="1" algn="ctr">
+              <a:lnSpc>
+                <a:spcPct val="90000"/>
+              </a:lnSpc>
+              <a:spcBef>
+                <a:spcPct val="0"/>
+              </a:spcBef>
+            </a:pPr>
+            <a:r>
+              <a:rPr lang="tr-TR" sz="3600" b="1" dirty="0">
+                <a:solidFill>
+                  <a:srgbClr val="FF1F20"/>
+                </a:solidFill>
+                <a:latin typeface="Arial" panose="020B0604020202020204" pitchFamily="34" charset="0"/>
+                <a:ea typeface="Verdana" panose="020B0604030504040204" pitchFamily="34" charset="0"/>
+                <a:cs typeface="Arial" panose="020B0604020202020204" pitchFamily="34" charset="0"/>
+              </a:rPr>
+              <a:t>DL KAYNAKLAR - MAKALELER</a:t>
+            </a:r>
+          </a:p>
+        </p:txBody>
+      </p:sp>
+    </p:spTree>
+    <p:extLst>
+      <p:ext uri="{BB962C8B-B14F-4D97-AF65-F5344CB8AC3E}">
+        <p14:creationId xmlns:p14="http://schemas.microsoft.com/office/powerpoint/2010/main" val="3211515688"/>
+      </p:ext>
+    </p:extLst>
+  </p:cSld>
+  <p:clrMapOvr>
+    <a:masterClrMapping/>
+  </p:clrMapOvr>
+  <p:timing>
+    <p:tnLst>
+      <p:par>
+        <p:cTn id="1" dur="indefinite" restart="never" nodeType="tmRoot">
+          <p:childTnLst>
+            <p:seq concurrent="1" nextAc="seek">
+              <p:cTn id="2" dur="indefinite" nodeType="mainSeq">
+                <p:childTnLst>
+                  <p:par>
+                    <p:cTn id="3" fill="hold">
+                      <p:stCondLst>
+                        <p:cond delay="indefinite"/>
+                      </p:stCondLst>
+                      <p:childTnLst>
+                        <p:par>
+                          <p:cTn id="4" fill="hold">
+                            <p:stCondLst>
+                              <p:cond delay="0"/>
+                            </p:stCondLst>
+                            <p:childTnLst>
+                              <p:par>
+                                <p:cTn id="5" presetID="10" presetClass="entr" presetSubtype="0" fill="hold" nodeType="clickEffect">
+                                  <p:stCondLst>
+                                    <p:cond delay="0"/>
+                                  </p:stCondLst>
+                                  <p:childTnLst>
+                                    <p:set>
+                                      <p:cBhvr>
+                                        <p:cTn id="6" dur="1" fill="hold">
+                                          <p:stCondLst>
+                                            <p:cond delay="0"/>
+                                          </p:stCondLst>
+                                        </p:cTn>
+                                        <p:tgtEl>
+                                          <p:spTgt spid="2">
+                                            <p:txEl>
+                                              <p:pRg st="0" end="0"/>
+                                            </p:txEl>
+                                          </p:spTgt>
+                                        </p:tgtEl>
+                                        <p:attrNameLst>
+                                          <p:attrName>style.visibility</p:attrName>
+                                        </p:attrNameLst>
+                                      </p:cBhvr>
+                                      <p:to>
+                                        <p:strVal val="visible"/>
+                                      </p:to>
+                                    </p:set>
+                                    <p:animEffect transition="in" filter="fade">
+                                      <p:cBhvr>
+                                        <p:cTn id="7" dur="500"/>
+                                        <p:tgtEl>
+                                          <p:spTgt spid="2">
+                                            <p:txEl>
+                                              <p:pRg st="0" end="0"/>
+                                            </p:txEl>
+                                          </p:spTgt>
+                                        </p:tgtEl>
+                                      </p:cBhvr>
+                                    </p:animEffect>
+                                  </p:childTnLst>
+                                </p:cTn>
+                              </p:par>
+                            </p:childTnLst>
+                          </p:cTn>
+                        </p:par>
+                      </p:childTnLst>
+                    </p:cTn>
+                  </p:par>
+                </p:childTnLst>
+              </p:cTn>
+              <p:prevCondLst>
+                <p:cond evt="onPrev" delay="0">
+                  <p:tgtEl>
+                    <p:sldTgt/>
+                  </p:tgtEl>
+                </p:cond>
+              </p:prevCondLst>
+              <p:nextCondLst>
+                <p:cond evt="onNext" delay="0">
+                  <p:tgtEl>
+                    <p:sldTgt/>
+                  </p:tgtEl>
+                </p:cond>
+              </p:nextCondLst>
+            </p:seq>
+          </p:childTnLst>
+        </p:cTn>
+      </p:par>
+    </p:tnLst>
+  </p:timing>
 </p:sld>
 </file>
 

</xml_diff>

<commit_message>
yeni egitim oncesi hazirlik
</commit_message>
<xml_diff>
--- a/opening_remarks.pptx
+++ b/opening_remarks.pptx
@@ -145,91 +145,6 @@
 <file path=ppt/changesInfos/changesInfo1.xml><?xml version="1.0" encoding="utf-8"?>
 <pc:chgInfo xmlns:a="http://schemas.openxmlformats.org/drawingml/2006/main" xmlns:r="http://schemas.openxmlformats.org/officeDocument/2006/relationships" xmlns:ac="http://schemas.microsoft.com/office/drawing/2013/main/command" xmlns:pc="http://schemas.microsoft.com/office/powerpoint/2013/main/command">
   <pc:docChgLst>
-    <pc:chgData name="Erkan ŞİRİN" userId="7f10ce1d6aaf8c5d" providerId="LiveId" clId="{D58FBEED-92FA-47F6-9D9E-9218785E3E2A}"/>
-    <pc:docChg chg="undo addSld delSld modSld">
-      <pc:chgData name="Erkan ŞİRİN" userId="7f10ce1d6aaf8c5d" providerId="LiveId" clId="{D58FBEED-92FA-47F6-9D9E-9218785E3E2A}" dt="2019-05-20T06:13:25.996" v="523" actId="20577"/>
-      <pc:docMkLst>
-        <pc:docMk/>
-      </pc:docMkLst>
-      <pc:sldChg chg="addSp delSp modSp">
-        <pc:chgData name="Erkan ŞİRİN" userId="7f10ce1d6aaf8c5d" providerId="LiveId" clId="{D58FBEED-92FA-47F6-9D9E-9218785E3E2A}" dt="2019-05-19T18:38:15.180" v="514" actId="14861"/>
-        <pc:sldMkLst>
-          <pc:docMk/>
-          <pc:sldMk cId="2918214722" sldId="256"/>
-        </pc:sldMkLst>
-        <pc:spChg chg="mod">
-          <ac:chgData name="Erkan ŞİRİN" userId="7f10ce1d6aaf8c5d" providerId="LiveId" clId="{D58FBEED-92FA-47F6-9D9E-9218785E3E2A}" dt="2019-05-19T18:38:15.180" v="514" actId="14861"/>
-          <ac:spMkLst>
-            <pc:docMk/>
-            <pc:sldMk cId="2918214722" sldId="256"/>
-            <ac:spMk id="4" creationId="{424A21BB-7B81-40BA-B1C9-62E84447A657}"/>
-          </ac:spMkLst>
-        </pc:spChg>
-        <pc:spChg chg="del mod">
-          <ac:chgData name="Erkan ŞİRİN" userId="7f10ce1d6aaf8c5d" providerId="LiveId" clId="{D58FBEED-92FA-47F6-9D9E-9218785E3E2A}" dt="2019-05-19T02:44:32.111" v="75"/>
-          <ac:spMkLst>
-            <pc:docMk/>
-            <pc:sldMk cId="2918214722" sldId="256"/>
-            <ac:spMk id="5" creationId="{2F3F6B1B-C576-4C5E-89BF-9AA33D5D6F7A}"/>
-          </ac:spMkLst>
-        </pc:spChg>
-        <pc:picChg chg="add mod ord modCrop">
-          <ac:chgData name="Erkan ŞİRİN" userId="7f10ce1d6aaf8c5d" providerId="LiveId" clId="{D58FBEED-92FA-47F6-9D9E-9218785E3E2A}" dt="2019-05-19T02:43:24.568" v="69" actId="1076"/>
-          <ac:picMkLst>
-            <pc:docMk/>
-            <pc:sldMk cId="2918214722" sldId="256"/>
-            <ac:picMk id="3" creationId="{71F9858B-0148-4498-87C1-84E0D6409DEC}"/>
-          </ac:picMkLst>
-        </pc:picChg>
-      </pc:sldChg>
-      <pc:sldChg chg="modSp">
-        <pc:chgData name="Erkan ŞİRİN" userId="7f10ce1d6aaf8c5d" providerId="LiveId" clId="{D58FBEED-92FA-47F6-9D9E-9218785E3E2A}" dt="2019-05-20T06:13:25.996" v="523" actId="20577"/>
-        <pc:sldMkLst>
-          <pc:docMk/>
-          <pc:sldMk cId="3627367780" sldId="328"/>
-        </pc:sldMkLst>
-        <pc:spChg chg="mod">
-          <ac:chgData name="Erkan ŞİRİN" userId="7f10ce1d6aaf8c5d" providerId="LiveId" clId="{D58FBEED-92FA-47F6-9D9E-9218785E3E2A}" dt="2019-05-20T06:13:25.996" v="523" actId="20577"/>
-          <ac:spMkLst>
-            <pc:docMk/>
-            <pc:sldMk cId="3627367780" sldId="328"/>
-            <ac:spMk id="3" creationId="{2DC8A280-C738-452F-B627-12CB68E50CC1}"/>
-          </ac:spMkLst>
-        </pc:spChg>
-        <pc:spChg chg="mod">
-          <ac:chgData name="Erkan ŞİRİN" userId="7f10ce1d6aaf8c5d" providerId="LiveId" clId="{D58FBEED-92FA-47F6-9D9E-9218785E3E2A}" dt="2019-05-19T02:46:00.506" v="89" actId="20577"/>
-          <ac:spMkLst>
-            <pc:docMk/>
-            <pc:sldMk cId="3627367780" sldId="328"/>
-            <ac:spMk id="16" creationId="{00000000-0000-0000-0000-000000000000}"/>
-          </ac:spMkLst>
-        </pc:spChg>
-      </pc:sldChg>
-      <pc:sldChg chg="add">
-        <pc:chgData name="Erkan ŞİRİN" userId="7f10ce1d6aaf8c5d" providerId="LiveId" clId="{D58FBEED-92FA-47F6-9D9E-9218785E3E2A}" dt="2019-05-19T02:49:48.161" v="95"/>
-        <pc:sldMkLst>
-          <pc:docMk/>
-          <pc:sldMk cId="809421221" sldId="336"/>
-        </pc:sldMkLst>
-      </pc:sldChg>
-      <pc:sldChg chg="modSp add modAnim">
-        <pc:chgData name="Erkan ŞİRİN" userId="7f10ce1d6aaf8c5d" providerId="LiveId" clId="{D58FBEED-92FA-47F6-9D9E-9218785E3E2A}" dt="2019-05-19T02:54:58.304" v="505" actId="20577"/>
-        <pc:sldMkLst>
-          <pc:docMk/>
-          <pc:sldMk cId="2519033183" sldId="337"/>
-        </pc:sldMkLst>
-        <pc:spChg chg="mod">
-          <ac:chgData name="Erkan ŞİRİN" userId="7f10ce1d6aaf8c5d" providerId="LiveId" clId="{D58FBEED-92FA-47F6-9D9E-9218785E3E2A}" dt="2019-05-19T02:54:58.304" v="505" actId="20577"/>
-          <ac:spMkLst>
-            <pc:docMk/>
-            <pc:sldMk cId="2519033183" sldId="337"/>
-            <ac:spMk id="3" creationId="{2DC8A280-C738-452F-B627-12CB68E50CC1}"/>
-          </ac:spMkLst>
-        </pc:spChg>
-      </pc:sldChg>
-    </pc:docChg>
-  </pc:docChgLst>
-  <pc:docChgLst>
     <pc:chgData name="Erkan ŞİRİN" userId="7f10ce1d6aaf8c5d" providerId="LiveId" clId="{9B0FE44A-60BF-4ED3-A9BD-90942CEEE884}"/>
     <pc:docChg chg="custSel modSld">
       <pc:chgData name="Erkan ŞİRİN" userId="7f10ce1d6aaf8c5d" providerId="LiveId" clId="{9B0FE44A-60BF-4ED3-A9BD-90942CEEE884}" dt="2019-05-06T06:45:15.043" v="640" actId="20577"/>
@@ -324,46 +239,84 @@
     </pc:docChg>
   </pc:docChgLst>
   <pc:docChgLst>
-    <pc:chgData name="Erkan ŞİRİN" userId="7f10ce1d6aaf8c5d" providerId="LiveId" clId="{8A07AB2F-FA98-4AB7-A034-4EBBDB3F8537}"/>
-    <pc:docChg chg="undo custSel addSld delSld modSld">
-      <pc:chgData name="Erkan ŞİRİN" userId="7f10ce1d6aaf8c5d" providerId="LiveId" clId="{8A07AB2F-FA98-4AB7-A034-4EBBDB3F8537}" dt="2019-05-15T18:09:25.938" v="863" actId="1076"/>
+    <pc:chgData name="Erkan ŞİRİN" userId="7f10ce1d6aaf8c5d" providerId="LiveId" clId="{D58FBEED-92FA-47F6-9D9E-9218785E3E2A}"/>
+    <pc:docChg chg="undo addSld delSld modSld">
+      <pc:chgData name="Erkan ŞİRİN" userId="7f10ce1d6aaf8c5d" providerId="LiveId" clId="{D58FBEED-92FA-47F6-9D9E-9218785E3E2A}" dt="2019-05-20T06:13:25.996" v="523" actId="20577"/>
       <pc:docMkLst>
         <pc:docMk/>
       </pc:docMkLst>
-      <pc:sldChg chg="modSp">
-        <pc:chgData name="Erkan ŞİRİN" userId="7f10ce1d6aaf8c5d" providerId="LiveId" clId="{8A07AB2F-FA98-4AB7-A034-4EBBDB3F8537}" dt="2019-05-15T18:09:25.938" v="863" actId="1076"/>
+      <pc:sldChg chg="addSp delSp modSp">
+        <pc:chgData name="Erkan ŞİRİN" userId="7f10ce1d6aaf8c5d" providerId="LiveId" clId="{D58FBEED-92FA-47F6-9D9E-9218785E3E2A}" dt="2019-05-19T18:38:15.180" v="514" actId="14861"/>
         <pc:sldMkLst>
           <pc:docMk/>
           <pc:sldMk cId="2918214722" sldId="256"/>
         </pc:sldMkLst>
         <pc:spChg chg="mod">
-          <ac:chgData name="Erkan ŞİRİN" userId="7f10ce1d6aaf8c5d" providerId="LiveId" clId="{8A07AB2F-FA98-4AB7-A034-4EBBDB3F8537}" dt="2019-05-15T18:09:22.837" v="862" actId="1076"/>
+          <ac:chgData name="Erkan ŞİRİN" userId="7f10ce1d6aaf8c5d" providerId="LiveId" clId="{D58FBEED-92FA-47F6-9D9E-9218785E3E2A}" dt="2019-05-19T18:38:15.180" v="514" actId="14861"/>
           <ac:spMkLst>
             <pc:docMk/>
             <pc:sldMk cId="2918214722" sldId="256"/>
             <ac:spMk id="4" creationId="{424A21BB-7B81-40BA-B1C9-62E84447A657}"/>
           </ac:spMkLst>
         </pc:spChg>
-        <pc:spChg chg="mod">
-          <ac:chgData name="Erkan ŞİRİN" userId="7f10ce1d6aaf8c5d" providerId="LiveId" clId="{8A07AB2F-FA98-4AB7-A034-4EBBDB3F8537}" dt="2019-05-15T18:09:25.938" v="863" actId="1076"/>
+        <pc:spChg chg="del mod">
+          <ac:chgData name="Erkan ŞİRİN" userId="7f10ce1d6aaf8c5d" providerId="LiveId" clId="{D58FBEED-92FA-47F6-9D9E-9218785E3E2A}" dt="2019-05-19T02:44:32.111" v="75"/>
           <ac:spMkLst>
             <pc:docMk/>
             <pc:sldMk cId="2918214722" sldId="256"/>
             <ac:spMk id="5" creationId="{2F3F6B1B-C576-4C5E-89BF-9AA33D5D6F7A}"/>
           </ac:spMkLst>
         </pc:spChg>
+        <pc:picChg chg="add mod ord modCrop">
+          <ac:chgData name="Erkan ŞİRİN" userId="7f10ce1d6aaf8c5d" providerId="LiveId" clId="{D58FBEED-92FA-47F6-9D9E-9218785E3E2A}" dt="2019-05-19T02:43:24.568" v="69" actId="1076"/>
+          <ac:picMkLst>
+            <pc:docMk/>
+            <pc:sldMk cId="2918214722" sldId="256"/>
+            <ac:picMk id="3" creationId="{71F9858B-0148-4498-87C1-84E0D6409DEC}"/>
+          </ac:picMkLst>
+        </pc:picChg>
       </pc:sldChg>
       <pc:sldChg chg="modSp">
-        <pc:chgData name="Erkan ŞİRİN" userId="7f10ce1d6aaf8c5d" providerId="LiveId" clId="{8A07AB2F-FA98-4AB7-A034-4EBBDB3F8537}" dt="2019-05-14T01:01:22.017" v="95" actId="20577"/>
+        <pc:chgData name="Erkan ŞİRİN" userId="7f10ce1d6aaf8c5d" providerId="LiveId" clId="{D58FBEED-92FA-47F6-9D9E-9218785E3E2A}" dt="2019-05-20T06:13:25.996" v="523" actId="20577"/>
         <pc:sldMkLst>
           <pc:docMk/>
           <pc:sldMk cId="3627367780" sldId="328"/>
         </pc:sldMkLst>
         <pc:spChg chg="mod">
-          <ac:chgData name="Erkan ŞİRİN" userId="7f10ce1d6aaf8c5d" providerId="LiveId" clId="{8A07AB2F-FA98-4AB7-A034-4EBBDB3F8537}" dt="2019-05-14T01:01:22.017" v="95" actId="20577"/>
+          <ac:chgData name="Erkan ŞİRİN" userId="7f10ce1d6aaf8c5d" providerId="LiveId" clId="{D58FBEED-92FA-47F6-9D9E-9218785E3E2A}" dt="2019-05-20T06:13:25.996" v="523" actId="20577"/>
           <ac:spMkLst>
             <pc:docMk/>
             <pc:sldMk cId="3627367780" sldId="328"/>
+            <ac:spMk id="3" creationId="{2DC8A280-C738-452F-B627-12CB68E50CC1}"/>
+          </ac:spMkLst>
+        </pc:spChg>
+        <pc:spChg chg="mod">
+          <ac:chgData name="Erkan ŞİRİN" userId="7f10ce1d6aaf8c5d" providerId="LiveId" clId="{D58FBEED-92FA-47F6-9D9E-9218785E3E2A}" dt="2019-05-19T02:46:00.506" v="89" actId="20577"/>
+          <ac:spMkLst>
+            <pc:docMk/>
+            <pc:sldMk cId="3627367780" sldId="328"/>
+            <ac:spMk id="16" creationId="{00000000-0000-0000-0000-000000000000}"/>
+          </ac:spMkLst>
+        </pc:spChg>
+      </pc:sldChg>
+      <pc:sldChg chg="add">
+        <pc:chgData name="Erkan ŞİRİN" userId="7f10ce1d6aaf8c5d" providerId="LiveId" clId="{D58FBEED-92FA-47F6-9D9E-9218785E3E2A}" dt="2019-05-19T02:49:48.161" v="95"/>
+        <pc:sldMkLst>
+          <pc:docMk/>
+          <pc:sldMk cId="809421221" sldId="336"/>
+        </pc:sldMkLst>
+      </pc:sldChg>
+      <pc:sldChg chg="modSp add modAnim">
+        <pc:chgData name="Erkan ŞİRİN" userId="7f10ce1d6aaf8c5d" providerId="LiveId" clId="{D58FBEED-92FA-47F6-9D9E-9218785E3E2A}" dt="2019-05-19T02:54:58.304" v="505" actId="20577"/>
+        <pc:sldMkLst>
+          <pc:docMk/>
+          <pc:sldMk cId="2519033183" sldId="337"/>
+        </pc:sldMkLst>
+        <pc:spChg chg="mod">
+          <ac:chgData name="Erkan ŞİRİN" userId="7f10ce1d6aaf8c5d" providerId="LiveId" clId="{D58FBEED-92FA-47F6-9D9E-9218785E3E2A}" dt="2019-05-19T02:54:58.304" v="505" actId="20577"/>
+          <ac:spMkLst>
+            <pc:docMk/>
+            <pc:sldMk cId="2519033183" sldId="337"/>
             <ac:spMk id="3" creationId="{2DC8A280-C738-452F-B627-12CB68E50CC1}"/>
           </ac:spMkLst>
         </pc:spChg>
@@ -896,6 +849,53 @@
       </pc:sldChg>
     </pc:docChg>
   </pc:docChgLst>
+  <pc:docChgLst>
+    <pc:chgData name="Erkan ŞİRİN" userId="7f10ce1d6aaf8c5d" providerId="LiveId" clId="{8A07AB2F-FA98-4AB7-A034-4EBBDB3F8537}"/>
+    <pc:docChg chg="undo custSel addSld delSld modSld">
+      <pc:chgData name="Erkan ŞİRİN" userId="7f10ce1d6aaf8c5d" providerId="LiveId" clId="{8A07AB2F-FA98-4AB7-A034-4EBBDB3F8537}" dt="2019-05-15T18:09:25.938" v="863" actId="1076"/>
+      <pc:docMkLst>
+        <pc:docMk/>
+      </pc:docMkLst>
+      <pc:sldChg chg="modSp">
+        <pc:chgData name="Erkan ŞİRİN" userId="7f10ce1d6aaf8c5d" providerId="LiveId" clId="{8A07AB2F-FA98-4AB7-A034-4EBBDB3F8537}" dt="2019-05-15T18:09:25.938" v="863" actId="1076"/>
+        <pc:sldMkLst>
+          <pc:docMk/>
+          <pc:sldMk cId="2918214722" sldId="256"/>
+        </pc:sldMkLst>
+        <pc:spChg chg="mod">
+          <ac:chgData name="Erkan ŞİRİN" userId="7f10ce1d6aaf8c5d" providerId="LiveId" clId="{8A07AB2F-FA98-4AB7-A034-4EBBDB3F8537}" dt="2019-05-15T18:09:22.837" v="862" actId="1076"/>
+          <ac:spMkLst>
+            <pc:docMk/>
+            <pc:sldMk cId="2918214722" sldId="256"/>
+            <ac:spMk id="4" creationId="{424A21BB-7B81-40BA-B1C9-62E84447A657}"/>
+          </ac:spMkLst>
+        </pc:spChg>
+        <pc:spChg chg="mod">
+          <ac:chgData name="Erkan ŞİRİN" userId="7f10ce1d6aaf8c5d" providerId="LiveId" clId="{8A07AB2F-FA98-4AB7-A034-4EBBDB3F8537}" dt="2019-05-15T18:09:25.938" v="863" actId="1076"/>
+          <ac:spMkLst>
+            <pc:docMk/>
+            <pc:sldMk cId="2918214722" sldId="256"/>
+            <ac:spMk id="5" creationId="{2F3F6B1B-C576-4C5E-89BF-9AA33D5D6F7A}"/>
+          </ac:spMkLst>
+        </pc:spChg>
+      </pc:sldChg>
+      <pc:sldChg chg="modSp">
+        <pc:chgData name="Erkan ŞİRİN" userId="7f10ce1d6aaf8c5d" providerId="LiveId" clId="{8A07AB2F-FA98-4AB7-A034-4EBBDB3F8537}" dt="2019-05-14T01:01:22.017" v="95" actId="20577"/>
+        <pc:sldMkLst>
+          <pc:docMk/>
+          <pc:sldMk cId="3627367780" sldId="328"/>
+        </pc:sldMkLst>
+        <pc:spChg chg="mod">
+          <ac:chgData name="Erkan ŞİRİN" userId="7f10ce1d6aaf8c5d" providerId="LiveId" clId="{8A07AB2F-FA98-4AB7-A034-4EBBDB3F8537}" dt="2019-05-14T01:01:22.017" v="95" actId="20577"/>
+          <ac:spMkLst>
+            <pc:docMk/>
+            <pc:sldMk cId="3627367780" sldId="328"/>
+            <ac:spMk id="3" creationId="{2DC8A280-C738-452F-B627-12CB68E50CC1}"/>
+          </ac:spMkLst>
+        </pc:spChg>
+      </pc:sldChg>
+    </pc:docChg>
+  </pc:docChgLst>
 </pc:chgInfo>
 </file>
 
@@ -1046,7 +1046,7 @@
           <a:p>
             <a:fld id="{BAB971F1-0A24-473E-8A66-D77E329B588E}" type="datetimeFigureOut">
               <a:rPr lang="tr-TR" smtClean="0"/>
-              <a:t>28.07.2019</a:t>
+              <a:t>7.11.2019</a:t>
             </a:fld>
             <a:endParaRPr lang="tr-TR"/>
           </a:p>
@@ -1244,7 +1244,7 @@
           <a:p>
             <a:fld id="{BAB971F1-0A24-473E-8A66-D77E329B588E}" type="datetimeFigureOut">
               <a:rPr lang="tr-TR" smtClean="0"/>
-              <a:t>28.07.2019</a:t>
+              <a:t>7.11.2019</a:t>
             </a:fld>
             <a:endParaRPr lang="tr-TR"/>
           </a:p>
@@ -1452,7 +1452,7 @@
           <a:p>
             <a:fld id="{BAB971F1-0A24-473E-8A66-D77E329B588E}" type="datetimeFigureOut">
               <a:rPr lang="tr-TR" smtClean="0"/>
-              <a:t>28.07.2019</a:t>
+              <a:t>7.11.2019</a:t>
             </a:fld>
             <a:endParaRPr lang="tr-TR"/>
           </a:p>
@@ -1650,7 +1650,7 @@
           <a:p>
             <a:fld id="{BAB971F1-0A24-473E-8A66-D77E329B588E}" type="datetimeFigureOut">
               <a:rPr lang="tr-TR" smtClean="0"/>
-              <a:t>28.07.2019</a:t>
+              <a:t>7.11.2019</a:t>
             </a:fld>
             <a:endParaRPr lang="tr-TR"/>
           </a:p>
@@ -1925,7 +1925,7 @@
           <a:p>
             <a:fld id="{BAB971F1-0A24-473E-8A66-D77E329B588E}" type="datetimeFigureOut">
               <a:rPr lang="tr-TR" smtClean="0"/>
-              <a:t>28.07.2019</a:t>
+              <a:t>7.11.2019</a:t>
             </a:fld>
             <a:endParaRPr lang="tr-TR"/>
           </a:p>
@@ -2190,7 +2190,7 @@
           <a:p>
             <a:fld id="{BAB971F1-0A24-473E-8A66-D77E329B588E}" type="datetimeFigureOut">
               <a:rPr lang="tr-TR" smtClean="0"/>
-              <a:t>28.07.2019</a:t>
+              <a:t>7.11.2019</a:t>
             </a:fld>
             <a:endParaRPr lang="tr-TR"/>
           </a:p>
@@ -2602,7 +2602,7 @@
           <a:p>
             <a:fld id="{BAB971F1-0A24-473E-8A66-D77E329B588E}" type="datetimeFigureOut">
               <a:rPr lang="tr-TR" smtClean="0"/>
-              <a:t>28.07.2019</a:t>
+              <a:t>7.11.2019</a:t>
             </a:fld>
             <a:endParaRPr lang="tr-TR"/>
           </a:p>
@@ -2743,7 +2743,7 @@
           <a:p>
             <a:fld id="{BAB971F1-0A24-473E-8A66-D77E329B588E}" type="datetimeFigureOut">
               <a:rPr lang="tr-TR" smtClean="0"/>
-              <a:t>28.07.2019</a:t>
+              <a:t>7.11.2019</a:t>
             </a:fld>
             <a:endParaRPr lang="tr-TR"/>
           </a:p>
@@ -2856,7 +2856,7 @@
           <a:p>
             <a:fld id="{BAB971F1-0A24-473E-8A66-D77E329B588E}" type="datetimeFigureOut">
               <a:rPr lang="tr-TR" smtClean="0"/>
-              <a:t>28.07.2019</a:t>
+              <a:t>7.11.2019</a:t>
             </a:fld>
             <a:endParaRPr lang="tr-TR"/>
           </a:p>
@@ -3167,7 +3167,7 @@
           <a:p>
             <a:fld id="{BAB971F1-0A24-473E-8A66-D77E329B588E}" type="datetimeFigureOut">
               <a:rPr lang="tr-TR" smtClean="0"/>
-              <a:t>28.07.2019</a:t>
+              <a:t>7.11.2019</a:t>
             </a:fld>
             <a:endParaRPr lang="tr-TR"/>
           </a:p>
@@ -3455,7 +3455,7 @@
           <a:p>
             <a:fld id="{BAB971F1-0A24-473E-8A66-D77E329B588E}" type="datetimeFigureOut">
               <a:rPr lang="tr-TR" smtClean="0"/>
-              <a:t>28.07.2019</a:t>
+              <a:t>7.11.2019</a:t>
             </a:fld>
             <a:endParaRPr lang="tr-TR"/>
           </a:p>
@@ -3696,7 +3696,7 @@
           <a:p>
             <a:fld id="{BAB971F1-0A24-473E-8A66-D77E329B588E}" type="datetimeFigureOut">
               <a:rPr lang="tr-TR" smtClean="0"/>
-              <a:t>28.07.2019</a:t>
+              <a:t>7.11.2019</a:t>
             </a:fld>
             <a:endParaRPr lang="tr-TR"/>
           </a:p>
@@ -4115,10 +4115,10 @@
       </p:grpSpPr>
       <p:pic>
         <p:nvPicPr>
-          <p:cNvPr id="3" name="Resim 2">
-            <a:extLst>
-              <a:ext uri="{FF2B5EF4-FFF2-40B4-BE49-F238E27FC236}">
-                <a16:creationId xmlns:a16="http://schemas.microsoft.com/office/drawing/2014/main" id="{71F9858B-0148-4498-87C1-84E0D6409DEC}"/>
+          <p:cNvPr id="7" name="Resim 6">
+            <a:extLst>
+              <a:ext uri="{FF2B5EF4-FFF2-40B4-BE49-F238E27FC236}">
+                <a16:creationId xmlns:a16="http://schemas.microsoft.com/office/drawing/2014/main" id="{F21ACDA5-4C88-4465-8ED1-B724E9D40CF7}"/>
               </a:ext>
             </a:extLst>
           </p:cNvPr>
@@ -4127,7 +4127,7 @@
           </p:cNvPicPr>
           <p:nvPr/>
         </p:nvPicPr>
-        <p:blipFill rotWithShape="1">
+        <p:blipFill>
           <a:blip r:embed="rId2">
             <a:extLst>
               <a:ext uri="{28A0092B-C50C-407E-A947-70E740481C1C}">
@@ -4135,144 +4135,20 @@
               </a:ext>
             </a:extLst>
           </a:blip>
-          <a:srcRect l="3297" t="12075" r="1683" b="5315"/>
-          <a:stretch/>
+          <a:stretch>
+            <a:fillRect/>
+          </a:stretch>
         </p:blipFill>
         <p:spPr>
           <a:xfrm>
-            <a:off x="0" y="1"/>
-            <a:ext cx="12192000" cy="6858000"/>
+            <a:off x="-76200" y="0"/>
+            <a:ext cx="12344400" cy="6858000"/>
           </a:xfrm>
           <a:prstGeom prst="rect">
             <a:avLst/>
           </a:prstGeom>
         </p:spPr>
       </p:pic>
-      <p:sp>
-        <p:nvSpPr>
-          <p:cNvPr id="4" name="Unvan 1">
-            <a:extLst>
-              <a:ext uri="{FF2B5EF4-FFF2-40B4-BE49-F238E27FC236}">
-                <a16:creationId xmlns:a16="http://schemas.microsoft.com/office/drawing/2014/main" id="{424A21BB-7B81-40BA-B1C9-62E84447A657}"/>
-              </a:ext>
-            </a:extLst>
-          </p:cNvPr>
-          <p:cNvSpPr>
-            <a:spLocks noGrp="1"/>
-          </p:cNvSpPr>
-          <p:nvPr>
-            <p:ph type="ctrTitle"/>
-          </p:nvPr>
-        </p:nvSpPr>
-        <p:spPr>
-          <a:xfrm>
-            <a:off x="2459601" y="2143125"/>
-            <a:ext cx="7247415" cy="2571750"/>
-          </a:xfrm>
-          <a:solidFill>
-            <a:schemeClr val="accent1">
-              <a:lumMod val="75000"/>
-            </a:schemeClr>
-          </a:solidFill>
-          <a:ln w="3175">
-            <a:noFill/>
-          </a:ln>
-          <a:effectLst>
-            <a:outerShdw blurRad="63500" sx="102000" sy="102000" algn="ctr" rotWithShape="0">
-              <a:prstClr val="black">
-                <a:alpha val="40000"/>
-              </a:prstClr>
-            </a:outerShdw>
-          </a:effectLst>
-        </p:spPr>
-        <p:txBody>
-          <a:bodyPr>
-            <a:noAutofit/>
-          </a:bodyPr>
-          <a:lstStyle/>
-          <a:p>
-            <a:r>
-              <a:rPr lang="tr-TR" sz="4200" b="1" dirty="0">
-                <a:solidFill>
-                  <a:schemeClr val="accent4">
-                    <a:lumMod val="60000"/>
-                    <a:lumOff val="40000"/>
-                  </a:schemeClr>
-                </a:solidFill>
-                <a:latin typeface="Roboto"/>
-                <a:ea typeface="+mn-ea"/>
-                <a:cs typeface="+mn-cs"/>
-              </a:rPr>
-              <a:t>Machine Learning </a:t>
-            </a:r>
-            <a:br>
-              <a:rPr lang="tr-TR" sz="4200" b="1" dirty="0">
-                <a:solidFill>
-                  <a:schemeClr val="accent4">
-                    <a:lumMod val="60000"/>
-                    <a:lumOff val="40000"/>
-                  </a:schemeClr>
-                </a:solidFill>
-                <a:latin typeface="Roboto"/>
-                <a:ea typeface="+mn-ea"/>
-                <a:cs typeface="+mn-cs"/>
-              </a:rPr>
-            </a:br>
-            <a:r>
-              <a:rPr lang="tr-TR" sz="4200" b="1" dirty="0" err="1">
-                <a:solidFill>
-                  <a:schemeClr val="accent4">
-                    <a:lumMod val="60000"/>
-                    <a:lumOff val="40000"/>
-                  </a:schemeClr>
-                </a:solidFill>
-                <a:latin typeface="Roboto"/>
-                <a:ea typeface="+mn-ea"/>
-                <a:cs typeface="+mn-cs"/>
-              </a:rPr>
-              <a:t>with</a:t>
-            </a:r>
-            <a:r>
-              <a:rPr lang="tr-TR" sz="4200" b="1" dirty="0">
-                <a:solidFill>
-                  <a:schemeClr val="accent4">
-                    <a:lumMod val="60000"/>
-                    <a:lumOff val="40000"/>
-                  </a:schemeClr>
-                </a:solidFill>
-                <a:latin typeface="Roboto"/>
-                <a:ea typeface="+mn-ea"/>
-                <a:cs typeface="+mn-cs"/>
-              </a:rPr>
-              <a:t> Python</a:t>
-            </a:r>
-            <a:br>
-              <a:rPr lang="tr-TR" sz="4200" b="1" dirty="0">
-                <a:solidFill>
-                  <a:schemeClr val="accent4">
-                    <a:lumMod val="60000"/>
-                    <a:lumOff val="40000"/>
-                  </a:schemeClr>
-                </a:solidFill>
-                <a:latin typeface="Roboto"/>
-                <a:ea typeface="+mn-ea"/>
-                <a:cs typeface="+mn-cs"/>
-              </a:rPr>
-            </a:br>
-            <a:endParaRPr lang="en-US" sz="4200" b="1" dirty="0">
-              <a:solidFill>
-                <a:schemeClr val="accent4">
-                  <a:lumMod val="60000"/>
-                  <a:lumOff val="40000"/>
-                </a:schemeClr>
-              </a:solidFill>
-              <a:latin typeface="Roboto"/>
-              <a:ea typeface="+mn-ea"/>
-              <a:cs typeface="+mn-cs"/>
-            </a:endParaRPr>
-          </a:p>
-        </p:txBody>
-      </p:sp>
     </p:spTree>
     <p:extLst>
       <p:ext uri="{BB962C8B-B14F-4D97-AF65-F5344CB8AC3E}">
@@ -7442,7 +7318,7 @@
         <p:spPr>
           <a:xfrm>
             <a:off x="2825013" y="1606590"/>
-            <a:ext cx="7964129" cy="3584379"/>
+            <a:ext cx="7964129" cy="4600042"/>
           </a:xfrm>
           <a:prstGeom prst="rect">
             <a:avLst/>
@@ -7573,6 +7449,45 @@
               </a:rPr>
               <a:t>	Tarım ve Kredi Kooperatifleri Birliği</a:t>
             </a:r>
+          </a:p>
+          <a:p>
+            <a:pPr marL="365125" indent="-365125" defTabSz="365125">
+              <a:lnSpc>
+                <a:spcPct val="150000"/>
+              </a:lnSpc>
+              <a:buFont typeface="+mj-lt"/>
+              <a:buAutoNum type="arabicPeriod"/>
+              <a:tabLst>
+                <a:tab pos="449263" algn="l"/>
+              </a:tabLst>
+            </a:pPr>
+            <a:r>
+              <a:rPr lang="tr-TR" sz="2200" dirty="0">
+                <a:latin typeface="Roboto"/>
+              </a:rPr>
+              <a:t>Hacettepe Üniversitesi</a:t>
+            </a:r>
+          </a:p>
+          <a:p>
+            <a:pPr marL="365125" indent="-365125" defTabSz="365125">
+              <a:lnSpc>
+                <a:spcPct val="150000"/>
+              </a:lnSpc>
+              <a:buFont typeface="+mj-lt"/>
+              <a:buAutoNum type="arabicPeriod"/>
+              <a:tabLst>
+                <a:tab pos="449263" algn="l"/>
+              </a:tabLst>
+            </a:pPr>
+            <a:r>
+              <a:rPr lang="tr-TR" sz="2200">
+                <a:latin typeface="Roboto"/>
+              </a:rPr>
+              <a:t>Amadeus</a:t>
+            </a:r>
+            <a:endParaRPr lang="tr-TR" sz="2200" dirty="0">
+              <a:latin typeface="Roboto"/>
+            </a:endParaRPr>
           </a:p>
           <a:p>
             <a:pPr marL="457200" indent="-457200">

</xml_diff>